<commit_message>
revolt php & async frameworks
</commit_message>
<xml_diff>
--- a/src/public/presentation.pptx
+++ b/src/public/presentation.pptx
@@ -5,7 +5,7 @@
     <p:sldMasterId id="2147483648" r:id="rId1"/>
   </p:sldMasterIdLst>
   <p:notesMasterIdLst>
-    <p:notesMasterId r:id="rId17"/>
+    <p:notesMasterId r:id="rId19"/>
   </p:notesMasterIdLst>
   <p:sldIdLst>
     <p:sldId id="256" r:id="rId2"/>
@@ -20,9 +20,11 @@
     <p:sldId id="271" r:id="rId11"/>
     <p:sldId id="260" r:id="rId12"/>
     <p:sldId id="270" r:id="rId13"/>
-    <p:sldId id="272" r:id="rId14"/>
-    <p:sldId id="274" r:id="rId15"/>
-    <p:sldId id="273" r:id="rId16"/>
+    <p:sldId id="276" r:id="rId14"/>
+    <p:sldId id="272" r:id="rId15"/>
+    <p:sldId id="274" r:id="rId16"/>
+    <p:sldId id="275" r:id="rId17"/>
+    <p:sldId id="273" r:id="rId18"/>
   </p:sldIdLst>
   <p:sldSz cx="12192000" cy="6858000"/>
   <p:notesSz cx="6858000" cy="9144000"/>
@@ -223,7 +225,7 @@
           <a:p>
             <a:fld id="{59937F01-D667-4AA1-A855-6C071D32A5BF}" type="datetimeFigureOut">
               <a:rPr lang="ru-RU" smtClean="0"/>
-              <a:t>12.01.2022</a:t>
+              <a:t>14.01.2022</a:t>
             </a:fld>
             <a:endParaRPr lang="ru-RU"/>
           </a:p>
@@ -1510,7 +1512,7 @@
                 <a:effectLst/>
                 <a:latin typeface="-apple-system"/>
               </a:rPr>
-              <a:t>. Самый старый проект, начинался еще с PHP 5.3. Сейчас минимальная требуемая версия PHP 5.3.8. Проект реализует стандарт </a:t>
+              <a:t>. Самый старый проект. Сейчас минимальная требуемая версия PHP 5.3.8. Проект реализует стандарт </a:t>
             </a:r>
             <a:r>
               <a:rPr lang="ru-RU" b="1" i="0" dirty="0" err="1">
@@ -1586,7 +1588,27 @@
                 <a:effectLst/>
                 <a:latin typeface="-apple-system"/>
               </a:rPr>
-              <a:t>. Именно эту реализацию я предпочитаю использовать. Минимальное требование PHP 7.0, а со следующей версии уже 7.3. Здесь используются </a:t>
+              <a:t>. Минимальное требование PHP 7.</a:t>
+            </a:r>
+            <a:r>
+              <a:rPr lang="en-US" b="0" i="0" dirty="0">
+                <a:solidFill>
+                  <a:srgbClr val="111111"/>
+                </a:solidFill>
+                <a:effectLst/>
+                <a:latin typeface="-apple-system"/>
+              </a:rPr>
+              <a:t>1</a:t>
+            </a:r>
+            <a:r>
+              <a:rPr lang="ru-RU" b="0" i="0" dirty="0">
+                <a:solidFill>
+                  <a:srgbClr val="111111"/>
+                </a:solidFill>
+                <a:effectLst/>
+                <a:latin typeface="-apple-system"/>
+              </a:rPr>
+              <a:t>. Здесь используются </a:t>
             </a:r>
             <a:r>
               <a:rPr lang="ru-RU" b="0" i="0" dirty="0" err="1">
@@ -1694,6 +1716,575 @@
               </a:rPr>
               <a:t> на китайском. Если знаете язык — вперед, но мне пока работать страшно.</a:t>
             </a:r>
+            <a:endParaRPr lang="en-US" b="0" i="0" dirty="0">
+              <a:solidFill>
+                <a:srgbClr val="111111"/>
+              </a:solidFill>
+              <a:effectLst/>
+              <a:latin typeface="-apple-system"/>
+            </a:endParaRPr>
+          </a:p>
+          <a:p>
+            <a:endParaRPr lang="en-US" b="0" i="0" dirty="0">
+              <a:solidFill>
+                <a:srgbClr val="111111"/>
+              </a:solidFill>
+              <a:effectLst/>
+              <a:latin typeface="-apple-system"/>
+            </a:endParaRPr>
+          </a:p>
+          <a:p>
+            <a:r>
+              <a:rPr lang="en-US" b="1" i="0" dirty="0">
+                <a:solidFill>
+                  <a:srgbClr val="111111"/>
+                </a:solidFill>
+                <a:effectLst/>
+                <a:latin typeface="-apple-system"/>
+              </a:rPr>
+              <a:t>REVOLT</a:t>
+            </a:r>
+            <a:r>
+              <a:rPr lang="en-US" b="0" i="0" dirty="0">
+                <a:solidFill>
+                  <a:srgbClr val="111111"/>
+                </a:solidFill>
+                <a:effectLst/>
+                <a:latin typeface="-apple-system"/>
+              </a:rPr>
+              <a:t>.</a:t>
+            </a:r>
+            <a:r>
+              <a:rPr lang="en-US" b="1" i="0" dirty="0">
+                <a:solidFill>
+                  <a:srgbClr val="111111"/>
+                </a:solidFill>
+                <a:effectLst/>
+                <a:latin typeface="-apple-system"/>
+              </a:rPr>
+              <a:t> </a:t>
+            </a:r>
+            <a:r>
+              <a:rPr lang="ru-RU" b="0" i="0" dirty="0">
+                <a:solidFill>
+                  <a:srgbClr val="111111"/>
+                </a:solidFill>
+                <a:effectLst/>
+                <a:latin typeface="-apple-system"/>
+              </a:rPr>
+              <a:t>Совместный проект </a:t>
+            </a:r>
+            <a:r>
+              <a:rPr lang="en-US" sz="1200" b="0" i="0" kern="1200" dirty="0">
+                <a:solidFill>
+                  <a:schemeClr val="tx1"/>
+                </a:solidFill>
+                <a:effectLst/>
+                <a:latin typeface="+mn-lt"/>
+                <a:ea typeface="+mn-ea"/>
+                <a:cs typeface="+mn-cs"/>
+              </a:rPr>
+              <a:t>Amp, </a:t>
+            </a:r>
+            <a:r>
+              <a:rPr lang="en-US" sz="1200" b="0" i="0" kern="1200" dirty="0" err="1">
+                <a:solidFill>
+                  <a:schemeClr val="tx1"/>
+                </a:solidFill>
+                <a:effectLst/>
+                <a:latin typeface="+mn-lt"/>
+                <a:ea typeface="+mn-ea"/>
+                <a:cs typeface="+mn-cs"/>
+              </a:rPr>
+              <a:t>ReactPHP</a:t>
+            </a:r>
+            <a:r>
+              <a:rPr lang="en-US" sz="1200" b="0" i="0" kern="1200" dirty="0">
+                <a:solidFill>
+                  <a:schemeClr val="tx1"/>
+                </a:solidFill>
+                <a:effectLst/>
+                <a:latin typeface="+mn-lt"/>
+                <a:ea typeface="+mn-ea"/>
+                <a:cs typeface="+mn-cs"/>
+              </a:rPr>
+              <a:t>. </a:t>
+            </a:r>
+            <a:r>
+              <a:rPr lang="ru-RU" sz="1200" b="0" i="0" kern="1200" dirty="0">
+                <a:solidFill>
+                  <a:schemeClr val="tx1"/>
+                </a:solidFill>
+                <a:effectLst/>
+                <a:latin typeface="+mn-lt"/>
+                <a:ea typeface="+mn-ea"/>
+                <a:cs typeface="+mn-cs"/>
+              </a:rPr>
+              <a:t>Для его работы требуется </a:t>
+            </a:r>
+            <a:r>
+              <a:rPr lang="en-US" sz="1200" b="0" i="0" kern="1200" dirty="0">
+                <a:solidFill>
+                  <a:schemeClr val="tx1"/>
+                </a:solidFill>
+                <a:effectLst/>
+                <a:latin typeface="+mn-lt"/>
+                <a:ea typeface="+mn-ea"/>
+                <a:cs typeface="+mn-cs"/>
+              </a:rPr>
+              <a:t>PHP 8.1 </a:t>
+            </a:r>
+            <a:r>
+              <a:rPr lang="ru-RU" sz="1200" b="0" i="0" kern="1200" dirty="0">
+                <a:solidFill>
+                  <a:schemeClr val="tx1"/>
+                </a:solidFill>
+                <a:effectLst/>
+                <a:latin typeface="+mn-lt"/>
+                <a:ea typeface="+mn-ea"/>
+                <a:cs typeface="+mn-cs"/>
+              </a:rPr>
+              <a:t>либо 8.0</a:t>
+            </a:r>
+            <a:r>
+              <a:rPr lang="en-US" sz="1200" b="0" i="0" kern="1200" dirty="0">
+                <a:solidFill>
+                  <a:schemeClr val="tx1"/>
+                </a:solidFill>
+                <a:effectLst/>
+                <a:latin typeface="+mn-lt"/>
+                <a:ea typeface="+mn-ea"/>
+                <a:cs typeface="+mn-cs"/>
+              </a:rPr>
+              <a:t>.7</a:t>
+            </a:r>
+            <a:r>
+              <a:rPr lang="ru-RU" sz="1200" b="0" i="0" kern="1200" dirty="0">
+                <a:solidFill>
+                  <a:schemeClr val="tx1"/>
+                </a:solidFill>
+                <a:effectLst/>
+                <a:latin typeface="+mn-lt"/>
+                <a:ea typeface="+mn-ea"/>
+                <a:cs typeface="+mn-cs"/>
+              </a:rPr>
+              <a:t> с дополнительно установленными </a:t>
+            </a:r>
+            <a:r>
+              <a:rPr lang="ru-RU" sz="1200" b="0" i="0" kern="1200" dirty="0" err="1">
+                <a:solidFill>
+                  <a:schemeClr val="tx1"/>
+                </a:solidFill>
+                <a:effectLst/>
+                <a:latin typeface="+mn-lt"/>
+                <a:ea typeface="+mn-ea"/>
+                <a:cs typeface="+mn-cs"/>
+              </a:rPr>
+              <a:t>файберами</a:t>
+            </a:r>
+            <a:r>
+              <a:rPr lang="ru-RU" sz="1200" b="0" i="0" kern="1200" dirty="0">
+                <a:solidFill>
+                  <a:schemeClr val="tx1"/>
+                </a:solidFill>
+                <a:effectLst/>
+                <a:latin typeface="+mn-lt"/>
+                <a:ea typeface="+mn-ea"/>
+                <a:cs typeface="+mn-cs"/>
+              </a:rPr>
+              <a:t> (</a:t>
+            </a:r>
+            <a:r>
+              <a:rPr lang="en-US" sz="1200" b="0" i="0" kern="1200" dirty="0" err="1">
+                <a:solidFill>
+                  <a:schemeClr val="tx1"/>
+                </a:solidFill>
+                <a:effectLst/>
+                <a:latin typeface="+mn-lt"/>
+                <a:ea typeface="+mn-ea"/>
+                <a:cs typeface="+mn-cs"/>
+              </a:rPr>
+              <a:t>ext</a:t>
+            </a:r>
+            <a:r>
+              <a:rPr lang="en-US" sz="1200" b="0" i="0" kern="1200" dirty="0">
+                <a:solidFill>
+                  <a:schemeClr val="tx1"/>
+                </a:solidFill>
+                <a:effectLst/>
+                <a:latin typeface="+mn-lt"/>
+                <a:ea typeface="+mn-ea"/>
+                <a:cs typeface="+mn-cs"/>
+              </a:rPr>
+              <a:t>-fiber</a:t>
+            </a:r>
+            <a:r>
+              <a:rPr lang="ru-RU" sz="1200" b="0" i="0" kern="1200" dirty="0">
+                <a:solidFill>
+                  <a:schemeClr val="tx1"/>
+                </a:solidFill>
+                <a:effectLst/>
+                <a:latin typeface="+mn-lt"/>
+                <a:ea typeface="+mn-ea"/>
+                <a:cs typeface="+mn-cs"/>
+              </a:rPr>
+              <a:t>). Проект очень молодой, текущая на данный момент его версия 0.2.0. На русском языке статей по нему не нашел. Данный проект позиционирует себя как базовый набор инструментов для асинхронной работы с </a:t>
+            </a:r>
+            <a:r>
+              <a:rPr lang="en-US" sz="1200" b="0" i="0" kern="1200" dirty="0">
+                <a:solidFill>
+                  <a:schemeClr val="tx1"/>
+                </a:solidFill>
+                <a:effectLst/>
+                <a:latin typeface="+mn-lt"/>
+                <a:ea typeface="+mn-ea"/>
+                <a:cs typeface="+mn-cs"/>
+              </a:rPr>
+              <a:t>PHP</a:t>
+            </a:r>
+            <a:r>
+              <a:rPr lang="ru-RU" sz="1200" b="0" i="0" kern="1200" dirty="0">
+                <a:solidFill>
+                  <a:schemeClr val="tx1"/>
+                </a:solidFill>
+                <a:effectLst/>
+                <a:latin typeface="+mn-lt"/>
+                <a:ea typeface="+mn-ea"/>
+                <a:cs typeface="+mn-cs"/>
+              </a:rPr>
+              <a:t> (не фреймворк)</a:t>
+            </a:r>
+            <a:r>
+              <a:rPr lang="en-US" sz="1200" b="0" i="0" kern="1200" dirty="0">
+                <a:solidFill>
+                  <a:schemeClr val="tx1"/>
+                </a:solidFill>
+                <a:effectLst/>
+                <a:latin typeface="+mn-lt"/>
+                <a:ea typeface="+mn-ea"/>
+                <a:cs typeface="+mn-cs"/>
+              </a:rPr>
+              <a:t>, </a:t>
+            </a:r>
+            <a:r>
+              <a:rPr lang="ru-RU" sz="1200" b="0" i="0" kern="1200" dirty="0">
+                <a:solidFill>
+                  <a:schemeClr val="tx1"/>
+                </a:solidFill>
+                <a:effectLst/>
+                <a:latin typeface="+mn-lt"/>
+                <a:ea typeface="+mn-ea"/>
+                <a:cs typeface="+mn-cs"/>
+              </a:rPr>
+              <a:t>лишенный недостатков </a:t>
+            </a:r>
+            <a:r>
+              <a:rPr lang="en-US" sz="1200" b="0" i="0" kern="1200" dirty="0">
+                <a:solidFill>
+                  <a:schemeClr val="tx1"/>
+                </a:solidFill>
+                <a:effectLst/>
+                <a:latin typeface="+mn-lt"/>
+                <a:ea typeface="+mn-ea"/>
+                <a:cs typeface="+mn-cs"/>
+              </a:rPr>
+              <a:t>Amp, </a:t>
+            </a:r>
+            <a:r>
+              <a:rPr lang="en-US" sz="1200" b="0" i="0" kern="1200" dirty="0" err="1">
+                <a:solidFill>
+                  <a:schemeClr val="tx1"/>
+                </a:solidFill>
+                <a:effectLst/>
+                <a:latin typeface="+mn-lt"/>
+                <a:ea typeface="+mn-ea"/>
+                <a:cs typeface="+mn-cs"/>
+              </a:rPr>
+              <a:t>ReactPHP</a:t>
+            </a:r>
+            <a:r>
+              <a:rPr lang="ru-RU" sz="1200" b="0" i="0" kern="1200" dirty="0">
+                <a:solidFill>
+                  <a:schemeClr val="tx1"/>
+                </a:solidFill>
+                <a:effectLst/>
+                <a:latin typeface="+mn-lt"/>
+                <a:ea typeface="+mn-ea"/>
+                <a:cs typeface="+mn-cs"/>
+              </a:rPr>
+              <a:t>, т.к. был написан с использованием </a:t>
+            </a:r>
+            <a:r>
+              <a:rPr lang="ru-RU" sz="1200" b="0" i="0" kern="1200" dirty="0" err="1">
+                <a:solidFill>
+                  <a:schemeClr val="tx1"/>
+                </a:solidFill>
+                <a:effectLst/>
+                <a:latin typeface="+mn-lt"/>
+                <a:ea typeface="+mn-ea"/>
+                <a:cs typeface="+mn-cs"/>
+              </a:rPr>
+              <a:t>фаберов</a:t>
+            </a:r>
+            <a:r>
+              <a:rPr lang="ru-RU" sz="1200" b="0" i="0" kern="1200" dirty="0">
+                <a:solidFill>
+                  <a:schemeClr val="tx1"/>
+                </a:solidFill>
+                <a:effectLst/>
+                <a:latin typeface="+mn-lt"/>
+                <a:ea typeface="+mn-ea"/>
+                <a:cs typeface="+mn-cs"/>
+              </a:rPr>
+              <a:t>, а не каким-то костыльным методом.</a:t>
+            </a:r>
+            <a:endParaRPr lang="en-US" b="1" i="0" dirty="0">
+              <a:solidFill>
+                <a:srgbClr val="111111"/>
+              </a:solidFill>
+              <a:effectLst/>
+              <a:latin typeface="-apple-system"/>
+            </a:endParaRPr>
+          </a:p>
+          <a:p>
+            <a:endParaRPr lang="ru-RU" b="0" i="0" dirty="0">
+              <a:solidFill>
+                <a:srgbClr val="111111"/>
+              </a:solidFill>
+              <a:effectLst/>
+              <a:latin typeface="-apple-system"/>
+            </a:endParaRPr>
+          </a:p>
+          <a:p>
+            <a:r>
+              <a:rPr lang="ru-RU" b="0" i="0" dirty="0">
+                <a:solidFill>
+                  <a:srgbClr val="111111"/>
+                </a:solidFill>
+                <a:effectLst/>
+                <a:latin typeface="-apple-system"/>
+              </a:rPr>
+              <a:t>Еще стоит упомянуть про </a:t>
+            </a:r>
+            <a:r>
+              <a:rPr lang="ru-RU" sz="1200" b="1" i="0" kern="1200" dirty="0" err="1">
+                <a:solidFill>
+                  <a:schemeClr val="tx1"/>
+                </a:solidFill>
+                <a:effectLst/>
+                <a:latin typeface="+mn-lt"/>
+                <a:ea typeface="+mn-ea"/>
+                <a:cs typeface="+mn-cs"/>
+              </a:rPr>
+              <a:t>RoadRunner</a:t>
+            </a:r>
+            <a:r>
+              <a:rPr lang="ru-RU" sz="1200" b="1" i="0" kern="1200" dirty="0">
+                <a:solidFill>
+                  <a:schemeClr val="tx1"/>
+                </a:solidFill>
+                <a:effectLst/>
+                <a:latin typeface="+mn-lt"/>
+                <a:ea typeface="+mn-ea"/>
+                <a:cs typeface="+mn-cs"/>
+              </a:rPr>
+              <a:t>, </a:t>
+            </a:r>
+            <a:r>
+              <a:rPr lang="ru-RU" sz="1200" b="0" i="0" kern="1200" dirty="0">
+                <a:solidFill>
+                  <a:schemeClr val="tx1"/>
+                </a:solidFill>
+                <a:effectLst/>
+                <a:latin typeface="+mn-lt"/>
+                <a:ea typeface="+mn-ea"/>
+                <a:cs typeface="+mn-cs"/>
+              </a:rPr>
+              <a:t>но он не про асинхронность, он про долгоживущий </a:t>
+            </a:r>
+            <a:r>
+              <a:rPr lang="en-US" sz="1200" b="0" i="0" kern="1200" dirty="0">
+                <a:solidFill>
+                  <a:schemeClr val="tx1"/>
+                </a:solidFill>
+                <a:effectLst/>
+                <a:latin typeface="+mn-lt"/>
+                <a:ea typeface="+mn-ea"/>
+                <a:cs typeface="+mn-cs"/>
+              </a:rPr>
+              <a:t>PHP</a:t>
+            </a:r>
+            <a:r>
+              <a:rPr lang="en-US" sz="1200" b="1" i="0" kern="1200" dirty="0">
+                <a:solidFill>
+                  <a:schemeClr val="tx1"/>
+                </a:solidFill>
+                <a:effectLst/>
+                <a:latin typeface="+mn-lt"/>
+                <a:ea typeface="+mn-ea"/>
+                <a:cs typeface="+mn-cs"/>
+              </a:rPr>
+              <a:t>.</a:t>
+            </a:r>
+            <a:r>
+              <a:rPr lang="ru-RU" sz="1200" b="0" i="0" kern="1200" dirty="0">
+                <a:solidFill>
+                  <a:schemeClr val="tx1"/>
+                </a:solidFill>
+                <a:effectLst/>
+                <a:latin typeface="+mn-lt"/>
+                <a:ea typeface="+mn-ea"/>
+                <a:cs typeface="+mn-cs"/>
+              </a:rPr>
+              <a:t> Написан на </a:t>
+            </a:r>
+            <a:r>
+              <a:rPr lang="ru-RU" sz="1200" b="0" i="0" kern="1200" dirty="0" err="1">
+                <a:solidFill>
+                  <a:schemeClr val="tx1"/>
+                </a:solidFill>
+                <a:effectLst/>
+                <a:latin typeface="+mn-lt"/>
+                <a:ea typeface="+mn-ea"/>
+                <a:cs typeface="+mn-cs"/>
+              </a:rPr>
+              <a:t>Go</a:t>
+            </a:r>
+            <a:r>
+              <a:rPr lang="ru-RU" sz="1200" b="0" i="0" kern="1200" dirty="0">
+                <a:solidFill>
+                  <a:schemeClr val="tx1"/>
+                </a:solidFill>
+                <a:effectLst/>
+                <a:latin typeface="+mn-lt"/>
+                <a:ea typeface="+mn-ea"/>
+                <a:cs typeface="+mn-cs"/>
+              </a:rPr>
+              <a:t>. </a:t>
+            </a:r>
+            <a:endParaRPr lang="en-US" sz="1200" b="0" i="0" kern="1200" dirty="0">
+              <a:solidFill>
+                <a:schemeClr val="tx1"/>
+              </a:solidFill>
+              <a:effectLst/>
+              <a:latin typeface="+mn-lt"/>
+              <a:ea typeface="+mn-ea"/>
+              <a:cs typeface="+mn-cs"/>
+            </a:endParaRPr>
+          </a:p>
+          <a:p>
+            <a:endParaRPr lang="ru-RU" sz="1200" b="0" i="0" kern="1200" dirty="0">
+              <a:solidFill>
+                <a:schemeClr val="tx1"/>
+              </a:solidFill>
+              <a:effectLst/>
+              <a:latin typeface="+mn-lt"/>
+              <a:ea typeface="+mn-ea"/>
+              <a:cs typeface="+mn-cs"/>
+            </a:endParaRPr>
+          </a:p>
+          <a:p>
+            <a:r>
+              <a:rPr lang="ru-RU" sz="1200" b="0" i="0" kern="1200" dirty="0">
+                <a:solidFill>
+                  <a:schemeClr val="tx1"/>
+                </a:solidFill>
+                <a:effectLst/>
+                <a:latin typeface="+mn-lt"/>
+                <a:ea typeface="+mn-ea"/>
+                <a:cs typeface="+mn-cs"/>
+              </a:rPr>
+              <a:t>Плюсы долгоживущего процесса:</a:t>
+            </a:r>
+          </a:p>
+          <a:p>
+            <a:r>
+              <a:rPr lang="ru-RU" sz="1200" b="0" i="0" kern="1200" dirty="0">
+                <a:solidFill>
+                  <a:schemeClr val="tx1"/>
+                </a:solidFill>
+                <a:effectLst/>
+                <a:latin typeface="+mn-lt"/>
+                <a:ea typeface="+mn-ea"/>
+                <a:cs typeface="+mn-cs"/>
+              </a:rPr>
+              <a:t>Не тратится время на </a:t>
+            </a:r>
+            <a:r>
+              <a:rPr lang="ru-RU" sz="1200" b="0" i="0" kern="1200" dirty="0" err="1">
+                <a:solidFill>
+                  <a:schemeClr val="tx1"/>
+                </a:solidFill>
+                <a:effectLst/>
+                <a:latin typeface="+mn-lt"/>
+                <a:ea typeface="+mn-ea"/>
+                <a:cs typeface="+mn-cs"/>
+              </a:rPr>
+              <a:t>booting</a:t>
+            </a:r>
+            <a:endParaRPr lang="ru-RU" sz="1200" b="0" i="0" kern="1200" dirty="0">
+              <a:solidFill>
+                <a:schemeClr val="tx1"/>
+              </a:solidFill>
+              <a:effectLst/>
+              <a:latin typeface="+mn-lt"/>
+              <a:ea typeface="+mn-ea"/>
+              <a:cs typeface="+mn-cs"/>
+            </a:endParaRPr>
+          </a:p>
+          <a:p>
+            <a:r>
+              <a:rPr lang="ru-RU" sz="1200" b="0" i="0" kern="1200" dirty="0">
+                <a:solidFill>
+                  <a:schemeClr val="tx1"/>
+                </a:solidFill>
+                <a:effectLst/>
+                <a:latin typeface="+mn-lt"/>
+                <a:ea typeface="+mn-ea"/>
+                <a:cs typeface="+mn-cs"/>
+              </a:rPr>
+              <a:t>Не тратится время на создание подключения к БД</a:t>
+            </a:r>
+          </a:p>
+          <a:p>
+            <a:r>
+              <a:rPr lang="ru-RU" sz="1200" b="0" i="0" kern="1200" dirty="0">
+                <a:solidFill>
+                  <a:schemeClr val="tx1"/>
+                </a:solidFill>
+                <a:effectLst/>
+                <a:latin typeface="+mn-lt"/>
+                <a:ea typeface="+mn-ea"/>
+                <a:cs typeface="+mn-cs"/>
+              </a:rPr>
+              <a:t>Возможность использования </a:t>
+            </a:r>
+            <a:r>
+              <a:rPr lang="ru-RU" sz="1200" b="0" i="0" kern="1200" dirty="0" err="1">
+                <a:solidFill>
+                  <a:schemeClr val="tx1"/>
+                </a:solidFill>
+                <a:effectLst/>
+                <a:latin typeface="+mn-lt"/>
+                <a:ea typeface="+mn-ea"/>
+                <a:cs typeface="+mn-cs"/>
+              </a:rPr>
+              <a:t>in-memory</a:t>
+            </a:r>
+            <a:r>
+              <a:rPr lang="ru-RU" sz="1200" b="0" i="0" kern="1200" dirty="0">
+                <a:solidFill>
+                  <a:schemeClr val="tx1"/>
+                </a:solidFill>
+                <a:effectLst/>
+                <a:latin typeface="+mn-lt"/>
+                <a:ea typeface="+mn-ea"/>
+                <a:cs typeface="+mn-cs"/>
+              </a:rPr>
+              <a:t> кэша прямо в процессе</a:t>
+            </a:r>
+          </a:p>
+          <a:p>
             <a:br>
               <a:rPr lang="ru-RU" dirty="0"/>
             </a:br>
@@ -1782,563 +2373,47 @@
           <a:lstStyle/>
           <a:p>
             <a:r>
-              <a:rPr lang="ru-RU" sz="1200" b="0" i="0" kern="1200" dirty="0">
-                <a:solidFill>
-                  <a:schemeClr val="tx1"/>
-                </a:solidFill>
-                <a:effectLst/>
-                <a:latin typeface="+mn-lt"/>
-                <a:ea typeface="+mn-ea"/>
-                <a:cs typeface="+mn-cs"/>
-              </a:rPr>
-              <a:t>Посмотрим как будет выглядеть клиент с использованием </a:t>
-            </a:r>
-            <a:r>
-              <a:rPr lang="ru-RU" sz="1200" b="0" i="0" kern="1200" dirty="0" err="1">
-                <a:solidFill>
-                  <a:schemeClr val="tx1"/>
-                </a:solidFill>
-                <a:effectLst/>
-                <a:latin typeface="+mn-lt"/>
-                <a:ea typeface="+mn-ea"/>
-                <a:cs typeface="+mn-cs"/>
-              </a:rPr>
-              <a:t>ReactPHP</a:t>
-            </a:r>
-            <a:r>
-              <a:rPr lang="ru-RU" sz="1200" b="0" i="0" kern="1200" dirty="0">
-                <a:solidFill>
-                  <a:schemeClr val="tx1"/>
-                </a:solidFill>
-                <a:effectLst/>
-                <a:latin typeface="+mn-lt"/>
-                <a:ea typeface="+mn-ea"/>
-                <a:cs typeface="+mn-cs"/>
-              </a:rPr>
-              <a:t> для </a:t>
-            </a:r>
-            <a:r>
-              <a:rPr lang="ru-RU" sz="1200" b="0" i="0" kern="1200" dirty="0" err="1">
-                <a:solidFill>
-                  <a:schemeClr val="tx1"/>
-                </a:solidFill>
-                <a:effectLst/>
-                <a:latin typeface="+mn-lt"/>
-                <a:ea typeface="+mn-ea"/>
-                <a:cs typeface="+mn-cs"/>
-              </a:rPr>
-              <a:t>MySQL</a:t>
-            </a:r>
-            <a:r>
-              <a:rPr lang="ru-RU" sz="1200" b="0" i="0" kern="1200" dirty="0">
-                <a:solidFill>
-                  <a:schemeClr val="tx1"/>
-                </a:solidFill>
-                <a:effectLst/>
-                <a:latin typeface="+mn-lt"/>
-                <a:ea typeface="+mn-ea"/>
-                <a:cs typeface="+mn-cs"/>
-              </a:rPr>
-              <a:t>.</a:t>
-            </a:r>
-            <a:endParaRPr lang="en-US" sz="1200" b="0" i="0" kern="1200" dirty="0">
-              <a:solidFill>
-                <a:schemeClr val="tx1"/>
-              </a:solidFill>
-              <a:effectLst/>
-              <a:latin typeface="+mn-lt"/>
-              <a:ea typeface="+mn-ea"/>
-              <a:cs typeface="+mn-cs"/>
-            </a:endParaRPr>
-          </a:p>
-          <a:p>
-            <a:r>
-              <a:rPr lang="ru-RU" sz="1200" b="0" i="0" kern="1200" dirty="0">
-                <a:solidFill>
-                  <a:schemeClr val="tx1"/>
-                </a:solidFill>
-                <a:effectLst/>
-                <a:latin typeface="+mn-lt"/>
-                <a:ea typeface="+mn-ea"/>
-                <a:cs typeface="+mn-cs"/>
-              </a:rPr>
-              <a:t>Все почти также, как мы написали: создаем </a:t>
-            </a:r>
-            <a:r>
-              <a:rPr lang="ru-RU" dirty="0" err="1"/>
-              <a:t>Сonnection</a:t>
-            </a:r>
-            <a:r>
-              <a:rPr lang="ru-RU" sz="1200" b="0" i="0" kern="1200" dirty="0">
-                <a:solidFill>
-                  <a:schemeClr val="tx1"/>
-                </a:solidFill>
-                <a:effectLst/>
-                <a:latin typeface="+mn-lt"/>
-                <a:ea typeface="+mn-ea"/>
-                <a:cs typeface="+mn-cs"/>
-              </a:rPr>
-              <a:t> и выполняем запрос. Можем установить </a:t>
-            </a:r>
-            <a:r>
-              <a:rPr lang="ru-RU" sz="1200" b="0" i="0" kern="1200" dirty="0" err="1">
-                <a:solidFill>
-                  <a:schemeClr val="tx1"/>
-                </a:solidFill>
-                <a:effectLst/>
-                <a:latin typeface="+mn-lt"/>
-                <a:ea typeface="+mn-ea"/>
-                <a:cs typeface="+mn-cs"/>
-              </a:rPr>
-              <a:t>колбэк</a:t>
-            </a:r>
-            <a:r>
-              <a:rPr lang="ru-RU" sz="1200" b="0" i="0" kern="1200" dirty="0">
-                <a:solidFill>
-                  <a:schemeClr val="tx1"/>
-                </a:solidFill>
-                <a:effectLst/>
-                <a:latin typeface="+mn-lt"/>
-                <a:ea typeface="+mn-ea"/>
-                <a:cs typeface="+mn-cs"/>
-              </a:rPr>
-              <a:t> для обработки результатов (вернуть </a:t>
-            </a:r>
-            <a:r>
-              <a:rPr lang="ru-RU" dirty="0" err="1"/>
-              <a:t>affected</a:t>
-            </a:r>
-            <a:r>
               <a:rPr lang="ru-RU" dirty="0"/>
-              <a:t> </a:t>
-            </a:r>
-            <a:r>
-              <a:rPr lang="ru-RU" dirty="0" err="1"/>
-              <a:t>rows</a:t>
-            </a:r>
-            <a:r>
-              <a:rPr lang="ru-RU" sz="1200" b="0" i="0" kern="1200" dirty="0">
-                <a:solidFill>
-                  <a:schemeClr val="tx1"/>
-                </a:solidFill>
-                <a:effectLst/>
-                <a:latin typeface="+mn-lt"/>
-                <a:ea typeface="+mn-ea"/>
-                <a:cs typeface="+mn-cs"/>
-              </a:rPr>
-              <a:t>):</a:t>
-            </a:r>
-          </a:p>
-          <a:p>
-            <a:r>
-              <a:rPr lang="ru-RU" sz="1200" b="0" i="0" kern="1200" dirty="0">
-                <a:solidFill>
-                  <a:schemeClr val="tx1"/>
-                </a:solidFill>
-                <a:effectLst/>
-                <a:latin typeface="+mn-lt"/>
-                <a:ea typeface="+mn-ea"/>
-                <a:cs typeface="+mn-cs"/>
-              </a:rPr>
-              <a:t>и </a:t>
-            </a:r>
-            <a:r>
-              <a:rPr lang="ru-RU" sz="1200" b="0" i="0" kern="1200" dirty="0" err="1">
-                <a:solidFill>
-                  <a:schemeClr val="tx1"/>
-                </a:solidFill>
-                <a:effectLst/>
-                <a:latin typeface="+mn-lt"/>
-                <a:ea typeface="+mn-ea"/>
-                <a:cs typeface="+mn-cs"/>
-              </a:rPr>
-              <a:t>колбэк</a:t>
-            </a:r>
-            <a:r>
-              <a:rPr lang="ru-RU" sz="1200" b="0" i="0" kern="1200" dirty="0">
-                <a:solidFill>
-                  <a:schemeClr val="tx1"/>
-                </a:solidFill>
-                <a:effectLst/>
-                <a:latin typeface="+mn-lt"/>
-                <a:ea typeface="+mn-ea"/>
-                <a:cs typeface="+mn-cs"/>
-              </a:rPr>
-              <a:t> для обработки ошибок:</a:t>
-            </a:r>
-            <a:endParaRPr lang="en-US" sz="1200" b="0" i="0" kern="1200" dirty="0">
-              <a:solidFill>
-                <a:schemeClr val="tx1"/>
-              </a:solidFill>
-              <a:effectLst/>
-              <a:latin typeface="+mn-lt"/>
-              <a:ea typeface="+mn-ea"/>
-              <a:cs typeface="+mn-cs"/>
-            </a:endParaRPr>
-          </a:p>
-          <a:p>
-            <a:r>
-              <a:rPr lang="en-US" sz="1200" b="0" i="0" kern="1200" dirty="0">
-                <a:solidFill>
-                  <a:schemeClr val="tx1"/>
-                </a:solidFill>
-                <a:effectLst/>
-                <a:latin typeface="+mn-lt"/>
-                <a:ea typeface="+mn-ea"/>
-                <a:cs typeface="+mn-cs"/>
-              </a:rPr>
-              <a:t>1 </a:t>
-            </a:r>
-            <a:r>
-              <a:rPr lang="ru-RU" sz="1200" b="0" i="0" kern="1200" dirty="0">
-                <a:solidFill>
-                  <a:schemeClr val="tx1"/>
-                </a:solidFill>
-                <a:effectLst/>
-                <a:latin typeface="+mn-lt"/>
-                <a:ea typeface="+mn-ea"/>
-                <a:cs typeface="+mn-cs"/>
-              </a:rPr>
-              <a:t>параметр</a:t>
-            </a:r>
-            <a:r>
-              <a:rPr lang="en-US" sz="1200" b="0" i="0" kern="1200" dirty="0">
-                <a:solidFill>
-                  <a:schemeClr val="tx1"/>
-                </a:solidFill>
-                <a:effectLst/>
-                <a:latin typeface="+mn-lt"/>
-                <a:ea typeface="+mn-ea"/>
-                <a:cs typeface="+mn-cs"/>
-              </a:rPr>
-              <a:t> </a:t>
-            </a:r>
-            <a:r>
-              <a:rPr lang="en-US" dirty="0">
-                <a:solidFill>
-                  <a:srgbClr val="6E7781"/>
-                </a:solidFill>
-                <a:latin typeface="Consolas" panose="020B0609020204030204" pitchFamily="49" charset="0"/>
-              </a:rPr>
-              <a:t>resolved. 2 rejected</a:t>
-            </a:r>
-            <a:endParaRPr lang="ru-RU" sz="1200" b="0" i="0" kern="1200" dirty="0">
-              <a:solidFill>
-                <a:schemeClr val="tx1"/>
-              </a:solidFill>
-              <a:effectLst/>
-              <a:latin typeface="+mn-lt"/>
-              <a:ea typeface="+mn-ea"/>
-              <a:cs typeface="+mn-cs"/>
-            </a:endParaRPr>
-          </a:p>
-          <a:p>
-            <a:endParaRPr lang="ru-RU" sz="1200" b="0" i="0" kern="1200" dirty="0">
-              <a:solidFill>
-                <a:schemeClr val="tx1"/>
-              </a:solidFill>
-              <a:effectLst/>
-              <a:latin typeface="+mn-lt"/>
-              <a:ea typeface="+mn-ea"/>
-              <a:cs typeface="+mn-cs"/>
-            </a:endParaRPr>
-          </a:p>
-          <a:p>
-            <a:r>
-              <a:rPr lang="ru-RU" sz="1200" b="0" i="0" kern="1200" dirty="0">
-                <a:solidFill>
-                  <a:schemeClr val="tx1"/>
-                </a:solidFill>
-                <a:effectLst/>
-                <a:latin typeface="+mn-lt"/>
-                <a:ea typeface="+mn-ea"/>
-                <a:cs typeface="+mn-cs"/>
-              </a:rPr>
-              <a:t>Из этих </a:t>
-            </a:r>
-            <a:r>
-              <a:rPr lang="ru-RU" sz="1200" b="0" i="0" kern="1200" dirty="0" err="1">
-                <a:solidFill>
-                  <a:schemeClr val="tx1"/>
-                </a:solidFill>
-                <a:effectLst/>
-                <a:latin typeface="+mn-lt"/>
-                <a:ea typeface="+mn-ea"/>
-                <a:cs typeface="+mn-cs"/>
-              </a:rPr>
-              <a:t>колбэков</a:t>
-            </a:r>
-            <a:r>
-              <a:rPr lang="ru-RU" sz="1200" b="0" i="0" kern="1200" dirty="0">
-                <a:solidFill>
-                  <a:schemeClr val="tx1"/>
-                </a:solidFill>
-                <a:effectLst/>
-                <a:latin typeface="+mn-lt"/>
-                <a:ea typeface="+mn-ea"/>
-                <a:cs typeface="+mn-cs"/>
-              </a:rPr>
-              <a:t> можно строить длинные-длинные цепочки, потому что каждый результат </a:t>
-            </a:r>
-            <a:r>
-              <a:rPr lang="ru-RU" dirty="0" err="1"/>
-              <a:t>then</a:t>
-            </a:r>
-            <a:r>
-              <a:rPr lang="ru-RU" sz="1200" b="0" i="0" kern="1200" dirty="0">
-                <a:solidFill>
-                  <a:schemeClr val="tx1"/>
-                </a:solidFill>
-                <a:effectLst/>
-                <a:latin typeface="+mn-lt"/>
-                <a:ea typeface="+mn-ea"/>
-                <a:cs typeface="+mn-cs"/>
-              </a:rPr>
-              <a:t> в </a:t>
-            </a:r>
-            <a:r>
-              <a:rPr lang="ru-RU" sz="1200" b="0" i="0" kern="1200" dirty="0" err="1">
-                <a:solidFill>
-                  <a:schemeClr val="tx1"/>
-                </a:solidFill>
-                <a:effectLst/>
-                <a:latin typeface="+mn-lt"/>
-                <a:ea typeface="+mn-ea"/>
-                <a:cs typeface="+mn-cs"/>
-              </a:rPr>
-              <a:t>ReactPHP</a:t>
-            </a:r>
-            <a:r>
-              <a:rPr lang="ru-RU" sz="1200" b="0" i="0" kern="1200" dirty="0">
-                <a:solidFill>
-                  <a:schemeClr val="tx1"/>
-                </a:solidFill>
-                <a:effectLst/>
-                <a:latin typeface="+mn-lt"/>
-                <a:ea typeface="+mn-ea"/>
-                <a:cs typeface="+mn-cs"/>
-              </a:rPr>
-              <a:t> также возвращает </a:t>
-            </a:r>
-            <a:r>
-              <a:rPr lang="ru-RU" sz="1200" b="0" i="0" kern="1200" dirty="0" err="1">
-                <a:solidFill>
-                  <a:schemeClr val="tx1"/>
-                </a:solidFill>
-                <a:effectLst/>
-                <a:latin typeface="+mn-lt"/>
-                <a:ea typeface="+mn-ea"/>
-                <a:cs typeface="+mn-cs"/>
-              </a:rPr>
-              <a:t>Promise</a:t>
-            </a:r>
-            <a:r>
-              <a:rPr lang="ru-RU" sz="1200" b="0" i="0" kern="1200" dirty="0">
-                <a:solidFill>
-                  <a:schemeClr val="tx1"/>
-                </a:solidFill>
-                <a:effectLst/>
-                <a:latin typeface="+mn-lt"/>
-                <a:ea typeface="+mn-ea"/>
-                <a:cs typeface="+mn-cs"/>
-              </a:rPr>
-              <a:t>.</a:t>
-            </a:r>
-          </a:p>
-          <a:p>
-            <a:r>
-              <a:rPr lang="ru-RU" sz="1200" b="0" i="0" kern="1200" dirty="0">
-                <a:solidFill>
-                  <a:schemeClr val="tx1"/>
-                </a:solidFill>
-                <a:effectLst/>
-                <a:latin typeface="+mn-lt"/>
-                <a:ea typeface="+mn-ea"/>
-                <a:cs typeface="+mn-cs"/>
-              </a:rPr>
-              <a:t>Это решение проблемы, которая называется «</a:t>
-            </a:r>
-            <a:r>
-              <a:rPr lang="ru-RU" sz="1200" b="0" i="0" kern="1200" dirty="0" err="1">
-                <a:solidFill>
-                  <a:schemeClr val="tx1"/>
-                </a:solidFill>
-                <a:effectLst/>
-                <a:latin typeface="+mn-lt"/>
-                <a:ea typeface="+mn-ea"/>
-                <a:cs typeface="+mn-cs"/>
-              </a:rPr>
-              <a:t>callback</a:t>
-            </a:r>
-            <a:r>
-              <a:rPr lang="ru-RU" sz="1200" b="0" i="0" kern="1200" dirty="0">
-                <a:solidFill>
-                  <a:schemeClr val="tx1"/>
-                </a:solidFill>
-                <a:effectLst/>
-                <a:latin typeface="+mn-lt"/>
-                <a:ea typeface="+mn-ea"/>
-                <a:cs typeface="+mn-cs"/>
-              </a:rPr>
-              <a:t> </a:t>
-            </a:r>
-            <a:r>
-              <a:rPr lang="ru-RU" sz="1200" b="0" i="0" kern="1200" dirty="0" err="1">
-                <a:solidFill>
-                  <a:schemeClr val="tx1"/>
-                </a:solidFill>
-                <a:effectLst/>
-                <a:latin typeface="+mn-lt"/>
-                <a:ea typeface="+mn-ea"/>
-                <a:cs typeface="+mn-cs"/>
-              </a:rPr>
-              <a:t>hell</a:t>
-            </a:r>
-            <a:r>
-              <a:rPr lang="ru-RU" sz="1200" b="0" i="0" kern="1200" dirty="0">
-                <a:solidFill>
-                  <a:schemeClr val="tx1"/>
-                </a:solidFill>
-                <a:effectLst/>
-                <a:latin typeface="+mn-lt"/>
-                <a:ea typeface="+mn-ea"/>
-                <a:cs typeface="+mn-cs"/>
-              </a:rPr>
-              <a:t>». К сожалению, в реализации </a:t>
-            </a:r>
-            <a:r>
-              <a:rPr lang="ru-RU" sz="1200" b="0" i="0" kern="1200" dirty="0" err="1">
-                <a:solidFill>
-                  <a:schemeClr val="tx1"/>
-                </a:solidFill>
-                <a:effectLst/>
-                <a:latin typeface="+mn-lt"/>
-                <a:ea typeface="+mn-ea"/>
-                <a:cs typeface="+mn-cs"/>
-              </a:rPr>
-              <a:t>ReactPHP</a:t>
-            </a:r>
-            <a:r>
-              <a:rPr lang="ru-RU" sz="1200" b="0" i="0" kern="1200" dirty="0">
-                <a:solidFill>
-                  <a:schemeClr val="tx1"/>
-                </a:solidFill>
-                <a:effectLst/>
-                <a:latin typeface="+mn-lt"/>
-                <a:ea typeface="+mn-ea"/>
-                <a:cs typeface="+mn-cs"/>
-              </a:rPr>
-              <a:t> это приводит к проблеме «</a:t>
-            </a:r>
-            <a:r>
-              <a:rPr lang="ru-RU" sz="1200" b="0" i="0" kern="1200" dirty="0" err="1">
-                <a:solidFill>
-                  <a:schemeClr val="tx1"/>
-                </a:solidFill>
-                <a:effectLst/>
-                <a:latin typeface="+mn-lt"/>
-                <a:ea typeface="+mn-ea"/>
-                <a:cs typeface="+mn-cs"/>
-              </a:rPr>
-              <a:t>Promise</a:t>
-            </a:r>
-            <a:r>
-              <a:rPr lang="ru-RU" sz="1200" b="0" i="0" kern="1200" dirty="0">
-                <a:solidFill>
-                  <a:schemeClr val="tx1"/>
-                </a:solidFill>
-                <a:effectLst/>
-                <a:latin typeface="+mn-lt"/>
-                <a:ea typeface="+mn-ea"/>
-                <a:cs typeface="+mn-cs"/>
-              </a:rPr>
-              <a:t> </a:t>
-            </a:r>
-            <a:r>
-              <a:rPr lang="ru-RU" sz="1200" b="0" i="0" kern="1200" dirty="0" err="1">
-                <a:solidFill>
-                  <a:schemeClr val="tx1"/>
-                </a:solidFill>
-                <a:effectLst/>
-                <a:latin typeface="+mn-lt"/>
-                <a:ea typeface="+mn-ea"/>
-                <a:cs typeface="+mn-cs"/>
-              </a:rPr>
-              <a:t>hell</a:t>
-            </a:r>
-            <a:r>
-              <a:rPr lang="ru-RU" sz="1200" b="0" i="0" kern="1200" dirty="0">
-                <a:solidFill>
-                  <a:schemeClr val="tx1"/>
-                </a:solidFill>
-                <a:effectLst/>
-                <a:latin typeface="+mn-lt"/>
-                <a:ea typeface="+mn-ea"/>
-                <a:cs typeface="+mn-cs"/>
-              </a:rPr>
-              <a:t>», когда </a:t>
-            </a:r>
-            <a:r>
-              <a:rPr lang="ru-RU" sz="1200" b="1" i="0" kern="1200" dirty="0">
-                <a:solidFill>
-                  <a:schemeClr val="tx1"/>
-                </a:solidFill>
-                <a:effectLst/>
-                <a:latin typeface="+mn-lt"/>
-                <a:ea typeface="+mn-ea"/>
-                <a:cs typeface="+mn-cs"/>
-              </a:rPr>
-              <a:t>для корректного подключения </a:t>
-            </a:r>
-            <a:r>
-              <a:rPr lang="ru-RU" sz="1200" b="1" i="0" kern="1200" dirty="0" err="1">
-                <a:solidFill>
-                  <a:schemeClr val="tx1"/>
-                </a:solidFill>
-                <a:effectLst/>
-                <a:latin typeface="+mn-lt"/>
-                <a:ea typeface="+mn-ea"/>
-                <a:cs typeface="+mn-cs"/>
-              </a:rPr>
-              <a:t>RabbitMQ</a:t>
-            </a:r>
-            <a:r>
-              <a:rPr lang="ru-RU" sz="1200" b="1" i="0" kern="1200" dirty="0">
-                <a:solidFill>
-                  <a:schemeClr val="tx1"/>
-                </a:solidFill>
-                <a:effectLst/>
-                <a:latin typeface="+mn-lt"/>
-                <a:ea typeface="+mn-ea"/>
-                <a:cs typeface="+mn-cs"/>
-              </a:rPr>
-              <a:t>, требуется10-11 </a:t>
-            </a:r>
-            <a:r>
-              <a:rPr lang="ru-RU" sz="1200" b="1" i="0" kern="1200" dirty="0" err="1">
-                <a:solidFill>
-                  <a:schemeClr val="tx1"/>
-                </a:solidFill>
-                <a:effectLst/>
-                <a:latin typeface="+mn-lt"/>
-                <a:ea typeface="+mn-ea"/>
-                <a:cs typeface="+mn-cs"/>
-              </a:rPr>
-              <a:t>колбэков</a:t>
-            </a:r>
-            <a:r>
-              <a:rPr lang="ru-RU" sz="1200" b="0" i="0" kern="1200" dirty="0">
-                <a:solidFill>
-                  <a:schemeClr val="tx1"/>
-                </a:solidFill>
-                <a:effectLst/>
-                <a:latin typeface="+mn-lt"/>
-                <a:ea typeface="+mn-ea"/>
-                <a:cs typeface="+mn-cs"/>
-              </a:rPr>
-              <a:t>. Работать с таким кодом и исправлять его сложно. Я быстро понял, что это не мое и перешел на AMPHP.</a:t>
-            </a:r>
+              <a:t>На данном слайде, вы видите список фреймворков и компонент, которые в том или ином виде реализовали асинхронность. Если честно, с этого списка знаю только 2, остальные первый раз вижу.</a:t>
+            </a:r>
+          </a:p>
+          <a:p>
             <a:endParaRPr lang="ru-RU" dirty="0"/>
+          </a:p>
+          <a:p>
+            <a:pPr marL="0" marR="0" lvl="0" indent="0" algn="l" defTabSz="914400" rtl="0" eaLnBrk="1" fontAlgn="auto" latinLnBrk="0" hangingPunct="1">
+              <a:lnSpc>
+                <a:spcPct val="100000"/>
+              </a:lnSpc>
+              <a:spcBef>
+                <a:spcPts val="0"/>
+              </a:spcBef>
+              <a:spcAft>
+                <a:spcPts val="0"/>
+              </a:spcAft>
+              <a:buClrTx/>
+              <a:buSzTx/>
+              <a:buFontTx/>
+              <a:buNone/>
+              <a:tabLst/>
+              <a:defRPr/>
+            </a:pPr>
+            <a:r>
+              <a:rPr lang="ru-RU" dirty="0"/>
+              <a:t>Подробнее про </a:t>
+            </a:r>
+            <a:r>
+              <a:rPr lang="en-US" dirty="0"/>
+              <a:t>Laravel Octane</a:t>
+            </a:r>
+            <a:r>
+              <a:rPr lang="ru-RU" dirty="0"/>
+              <a:t>, желательно </a:t>
+            </a:r>
+            <a:r>
+              <a:rPr lang="ru-RU"/>
+              <a:t>с примером.</a:t>
+            </a:r>
           </a:p>
         </p:txBody>
       </p:sp>
@@ -2368,7 +2443,7 @@
     </p:spTree>
     <p:extLst>
       <p:ext uri="{BB962C8B-B14F-4D97-AF65-F5344CB8AC3E}">
-        <p14:creationId xmlns:p14="http://schemas.microsoft.com/office/powerpoint/2010/main" val="680570946"/>
+        <p14:creationId xmlns:p14="http://schemas.microsoft.com/office/powerpoint/2010/main" val="3602402040"/>
       </p:ext>
     </p:extLst>
   </p:cSld>
@@ -2422,6 +2497,563 @@
           <a:bodyPr/>
           <a:lstStyle/>
           <a:p>
+            <a:r>
+              <a:rPr lang="ru-RU" sz="1200" b="0" i="0" kern="1200" dirty="0">
+                <a:solidFill>
+                  <a:schemeClr val="tx1"/>
+                </a:solidFill>
+                <a:effectLst/>
+                <a:latin typeface="+mn-lt"/>
+                <a:ea typeface="+mn-ea"/>
+                <a:cs typeface="+mn-cs"/>
+              </a:rPr>
+              <a:t>Посмотрим как будет выглядеть клиент с использованием </a:t>
+            </a:r>
+            <a:r>
+              <a:rPr lang="ru-RU" sz="1200" b="0" i="0" kern="1200" dirty="0" err="1">
+                <a:solidFill>
+                  <a:schemeClr val="tx1"/>
+                </a:solidFill>
+                <a:effectLst/>
+                <a:latin typeface="+mn-lt"/>
+                <a:ea typeface="+mn-ea"/>
+                <a:cs typeface="+mn-cs"/>
+              </a:rPr>
+              <a:t>ReactPHP</a:t>
+            </a:r>
+            <a:r>
+              <a:rPr lang="ru-RU" sz="1200" b="0" i="0" kern="1200" dirty="0">
+                <a:solidFill>
+                  <a:schemeClr val="tx1"/>
+                </a:solidFill>
+                <a:effectLst/>
+                <a:latin typeface="+mn-lt"/>
+                <a:ea typeface="+mn-ea"/>
+                <a:cs typeface="+mn-cs"/>
+              </a:rPr>
+              <a:t> для </a:t>
+            </a:r>
+            <a:r>
+              <a:rPr lang="ru-RU" sz="1200" b="0" i="0" kern="1200" dirty="0" err="1">
+                <a:solidFill>
+                  <a:schemeClr val="tx1"/>
+                </a:solidFill>
+                <a:effectLst/>
+                <a:latin typeface="+mn-lt"/>
+                <a:ea typeface="+mn-ea"/>
+                <a:cs typeface="+mn-cs"/>
+              </a:rPr>
+              <a:t>MySQL</a:t>
+            </a:r>
+            <a:r>
+              <a:rPr lang="ru-RU" sz="1200" b="0" i="0" kern="1200" dirty="0">
+                <a:solidFill>
+                  <a:schemeClr val="tx1"/>
+                </a:solidFill>
+                <a:effectLst/>
+                <a:latin typeface="+mn-lt"/>
+                <a:ea typeface="+mn-ea"/>
+                <a:cs typeface="+mn-cs"/>
+              </a:rPr>
+              <a:t>.</a:t>
+            </a:r>
+            <a:endParaRPr lang="en-US" sz="1200" b="0" i="0" kern="1200" dirty="0">
+              <a:solidFill>
+                <a:schemeClr val="tx1"/>
+              </a:solidFill>
+              <a:effectLst/>
+              <a:latin typeface="+mn-lt"/>
+              <a:ea typeface="+mn-ea"/>
+              <a:cs typeface="+mn-cs"/>
+            </a:endParaRPr>
+          </a:p>
+          <a:p>
+            <a:r>
+              <a:rPr lang="ru-RU" sz="1200" b="0" i="0" kern="1200" dirty="0">
+                <a:solidFill>
+                  <a:schemeClr val="tx1"/>
+                </a:solidFill>
+                <a:effectLst/>
+                <a:latin typeface="+mn-lt"/>
+                <a:ea typeface="+mn-ea"/>
+                <a:cs typeface="+mn-cs"/>
+              </a:rPr>
+              <a:t>Все почти также, как мы написали: создаем </a:t>
+            </a:r>
+            <a:r>
+              <a:rPr lang="ru-RU" dirty="0" err="1"/>
+              <a:t>Сonnection</a:t>
+            </a:r>
+            <a:r>
+              <a:rPr lang="ru-RU" sz="1200" b="0" i="0" kern="1200" dirty="0">
+                <a:solidFill>
+                  <a:schemeClr val="tx1"/>
+                </a:solidFill>
+                <a:effectLst/>
+                <a:latin typeface="+mn-lt"/>
+                <a:ea typeface="+mn-ea"/>
+                <a:cs typeface="+mn-cs"/>
+              </a:rPr>
+              <a:t> и выполняем запрос. Можем установить </a:t>
+            </a:r>
+            <a:r>
+              <a:rPr lang="ru-RU" sz="1200" b="0" i="0" kern="1200" dirty="0" err="1">
+                <a:solidFill>
+                  <a:schemeClr val="tx1"/>
+                </a:solidFill>
+                <a:effectLst/>
+                <a:latin typeface="+mn-lt"/>
+                <a:ea typeface="+mn-ea"/>
+                <a:cs typeface="+mn-cs"/>
+              </a:rPr>
+              <a:t>колбэк</a:t>
+            </a:r>
+            <a:r>
+              <a:rPr lang="ru-RU" sz="1200" b="0" i="0" kern="1200" dirty="0">
+                <a:solidFill>
+                  <a:schemeClr val="tx1"/>
+                </a:solidFill>
+                <a:effectLst/>
+                <a:latin typeface="+mn-lt"/>
+                <a:ea typeface="+mn-ea"/>
+                <a:cs typeface="+mn-cs"/>
+              </a:rPr>
+              <a:t> для обработки результатов (вернуть </a:t>
+            </a:r>
+            <a:r>
+              <a:rPr lang="ru-RU" dirty="0" err="1"/>
+              <a:t>affected</a:t>
+            </a:r>
+            <a:r>
+              <a:rPr lang="ru-RU" dirty="0"/>
+              <a:t> </a:t>
+            </a:r>
+            <a:r>
+              <a:rPr lang="ru-RU" dirty="0" err="1"/>
+              <a:t>rows</a:t>
+            </a:r>
+            <a:r>
+              <a:rPr lang="ru-RU" sz="1200" b="0" i="0" kern="1200" dirty="0">
+                <a:solidFill>
+                  <a:schemeClr val="tx1"/>
+                </a:solidFill>
+                <a:effectLst/>
+                <a:latin typeface="+mn-lt"/>
+                <a:ea typeface="+mn-ea"/>
+                <a:cs typeface="+mn-cs"/>
+              </a:rPr>
+              <a:t>):</a:t>
+            </a:r>
+          </a:p>
+          <a:p>
+            <a:r>
+              <a:rPr lang="ru-RU" sz="1200" b="0" i="0" kern="1200" dirty="0">
+                <a:solidFill>
+                  <a:schemeClr val="tx1"/>
+                </a:solidFill>
+                <a:effectLst/>
+                <a:latin typeface="+mn-lt"/>
+                <a:ea typeface="+mn-ea"/>
+                <a:cs typeface="+mn-cs"/>
+              </a:rPr>
+              <a:t>и </a:t>
+            </a:r>
+            <a:r>
+              <a:rPr lang="ru-RU" sz="1200" b="0" i="0" kern="1200" dirty="0" err="1">
+                <a:solidFill>
+                  <a:schemeClr val="tx1"/>
+                </a:solidFill>
+                <a:effectLst/>
+                <a:latin typeface="+mn-lt"/>
+                <a:ea typeface="+mn-ea"/>
+                <a:cs typeface="+mn-cs"/>
+              </a:rPr>
+              <a:t>колбэк</a:t>
+            </a:r>
+            <a:r>
+              <a:rPr lang="ru-RU" sz="1200" b="0" i="0" kern="1200" dirty="0">
+                <a:solidFill>
+                  <a:schemeClr val="tx1"/>
+                </a:solidFill>
+                <a:effectLst/>
+                <a:latin typeface="+mn-lt"/>
+                <a:ea typeface="+mn-ea"/>
+                <a:cs typeface="+mn-cs"/>
+              </a:rPr>
+              <a:t> для обработки ошибок:</a:t>
+            </a:r>
+            <a:endParaRPr lang="en-US" sz="1200" b="0" i="0" kern="1200" dirty="0">
+              <a:solidFill>
+                <a:schemeClr val="tx1"/>
+              </a:solidFill>
+              <a:effectLst/>
+              <a:latin typeface="+mn-lt"/>
+              <a:ea typeface="+mn-ea"/>
+              <a:cs typeface="+mn-cs"/>
+            </a:endParaRPr>
+          </a:p>
+          <a:p>
+            <a:r>
+              <a:rPr lang="en-US" sz="1200" b="0" i="0" kern="1200" dirty="0">
+                <a:solidFill>
+                  <a:schemeClr val="tx1"/>
+                </a:solidFill>
+                <a:effectLst/>
+                <a:latin typeface="+mn-lt"/>
+                <a:ea typeface="+mn-ea"/>
+                <a:cs typeface="+mn-cs"/>
+              </a:rPr>
+              <a:t>1 </a:t>
+            </a:r>
+            <a:r>
+              <a:rPr lang="ru-RU" sz="1200" b="0" i="0" kern="1200" dirty="0">
+                <a:solidFill>
+                  <a:schemeClr val="tx1"/>
+                </a:solidFill>
+                <a:effectLst/>
+                <a:latin typeface="+mn-lt"/>
+                <a:ea typeface="+mn-ea"/>
+                <a:cs typeface="+mn-cs"/>
+              </a:rPr>
+              <a:t>параметр</a:t>
+            </a:r>
+            <a:r>
+              <a:rPr lang="en-US" sz="1200" b="0" i="0" kern="1200" dirty="0">
+                <a:solidFill>
+                  <a:schemeClr val="tx1"/>
+                </a:solidFill>
+                <a:effectLst/>
+                <a:latin typeface="+mn-lt"/>
+                <a:ea typeface="+mn-ea"/>
+                <a:cs typeface="+mn-cs"/>
+              </a:rPr>
+              <a:t> </a:t>
+            </a:r>
+            <a:r>
+              <a:rPr lang="en-US" dirty="0">
+                <a:solidFill>
+                  <a:srgbClr val="6E7781"/>
+                </a:solidFill>
+                <a:latin typeface="Consolas" panose="020B0609020204030204" pitchFamily="49" charset="0"/>
+              </a:rPr>
+              <a:t>resolved. 2 rejected</a:t>
+            </a:r>
+            <a:endParaRPr lang="ru-RU" sz="1200" b="0" i="0" kern="1200" dirty="0">
+              <a:solidFill>
+                <a:schemeClr val="tx1"/>
+              </a:solidFill>
+              <a:effectLst/>
+              <a:latin typeface="+mn-lt"/>
+              <a:ea typeface="+mn-ea"/>
+              <a:cs typeface="+mn-cs"/>
+            </a:endParaRPr>
+          </a:p>
+          <a:p>
+            <a:endParaRPr lang="ru-RU" sz="1200" b="0" i="0" kern="1200" dirty="0">
+              <a:solidFill>
+                <a:schemeClr val="tx1"/>
+              </a:solidFill>
+              <a:effectLst/>
+              <a:latin typeface="+mn-lt"/>
+              <a:ea typeface="+mn-ea"/>
+              <a:cs typeface="+mn-cs"/>
+            </a:endParaRPr>
+          </a:p>
+          <a:p>
+            <a:r>
+              <a:rPr lang="ru-RU" sz="1200" b="0" i="0" kern="1200" dirty="0">
+                <a:solidFill>
+                  <a:schemeClr val="tx1"/>
+                </a:solidFill>
+                <a:effectLst/>
+                <a:latin typeface="+mn-lt"/>
+                <a:ea typeface="+mn-ea"/>
+                <a:cs typeface="+mn-cs"/>
+              </a:rPr>
+              <a:t>Из этих </a:t>
+            </a:r>
+            <a:r>
+              <a:rPr lang="ru-RU" sz="1200" b="0" i="0" kern="1200" dirty="0" err="1">
+                <a:solidFill>
+                  <a:schemeClr val="tx1"/>
+                </a:solidFill>
+                <a:effectLst/>
+                <a:latin typeface="+mn-lt"/>
+                <a:ea typeface="+mn-ea"/>
+                <a:cs typeface="+mn-cs"/>
+              </a:rPr>
+              <a:t>колбэков</a:t>
+            </a:r>
+            <a:r>
+              <a:rPr lang="ru-RU" sz="1200" b="0" i="0" kern="1200" dirty="0">
+                <a:solidFill>
+                  <a:schemeClr val="tx1"/>
+                </a:solidFill>
+                <a:effectLst/>
+                <a:latin typeface="+mn-lt"/>
+                <a:ea typeface="+mn-ea"/>
+                <a:cs typeface="+mn-cs"/>
+              </a:rPr>
+              <a:t> можно строить длинные-длинные цепочки, потому что каждый результат </a:t>
+            </a:r>
+            <a:r>
+              <a:rPr lang="ru-RU" dirty="0" err="1"/>
+              <a:t>then</a:t>
+            </a:r>
+            <a:r>
+              <a:rPr lang="ru-RU" sz="1200" b="0" i="0" kern="1200" dirty="0">
+                <a:solidFill>
+                  <a:schemeClr val="tx1"/>
+                </a:solidFill>
+                <a:effectLst/>
+                <a:latin typeface="+mn-lt"/>
+                <a:ea typeface="+mn-ea"/>
+                <a:cs typeface="+mn-cs"/>
+              </a:rPr>
+              <a:t> в </a:t>
+            </a:r>
+            <a:r>
+              <a:rPr lang="ru-RU" sz="1200" b="0" i="0" kern="1200" dirty="0" err="1">
+                <a:solidFill>
+                  <a:schemeClr val="tx1"/>
+                </a:solidFill>
+                <a:effectLst/>
+                <a:latin typeface="+mn-lt"/>
+                <a:ea typeface="+mn-ea"/>
+                <a:cs typeface="+mn-cs"/>
+              </a:rPr>
+              <a:t>ReactPHP</a:t>
+            </a:r>
+            <a:r>
+              <a:rPr lang="ru-RU" sz="1200" b="0" i="0" kern="1200" dirty="0">
+                <a:solidFill>
+                  <a:schemeClr val="tx1"/>
+                </a:solidFill>
+                <a:effectLst/>
+                <a:latin typeface="+mn-lt"/>
+                <a:ea typeface="+mn-ea"/>
+                <a:cs typeface="+mn-cs"/>
+              </a:rPr>
+              <a:t> также возвращает </a:t>
+            </a:r>
+            <a:r>
+              <a:rPr lang="ru-RU" sz="1200" b="0" i="0" kern="1200" dirty="0" err="1">
+                <a:solidFill>
+                  <a:schemeClr val="tx1"/>
+                </a:solidFill>
+                <a:effectLst/>
+                <a:latin typeface="+mn-lt"/>
+                <a:ea typeface="+mn-ea"/>
+                <a:cs typeface="+mn-cs"/>
+              </a:rPr>
+              <a:t>Promise</a:t>
+            </a:r>
+            <a:r>
+              <a:rPr lang="ru-RU" sz="1200" b="0" i="0" kern="1200" dirty="0">
+                <a:solidFill>
+                  <a:schemeClr val="tx1"/>
+                </a:solidFill>
+                <a:effectLst/>
+                <a:latin typeface="+mn-lt"/>
+                <a:ea typeface="+mn-ea"/>
+                <a:cs typeface="+mn-cs"/>
+              </a:rPr>
+              <a:t>.</a:t>
+            </a:r>
+          </a:p>
+          <a:p>
+            <a:r>
+              <a:rPr lang="ru-RU" sz="1200" b="0" i="0" kern="1200" dirty="0">
+                <a:solidFill>
+                  <a:schemeClr val="tx1"/>
+                </a:solidFill>
+                <a:effectLst/>
+                <a:latin typeface="+mn-lt"/>
+                <a:ea typeface="+mn-ea"/>
+                <a:cs typeface="+mn-cs"/>
+              </a:rPr>
+              <a:t>Это решение проблемы, которая называется «</a:t>
+            </a:r>
+            <a:r>
+              <a:rPr lang="ru-RU" sz="1200" b="0" i="0" kern="1200" dirty="0" err="1">
+                <a:solidFill>
+                  <a:schemeClr val="tx1"/>
+                </a:solidFill>
+                <a:effectLst/>
+                <a:latin typeface="+mn-lt"/>
+                <a:ea typeface="+mn-ea"/>
+                <a:cs typeface="+mn-cs"/>
+              </a:rPr>
+              <a:t>callback</a:t>
+            </a:r>
+            <a:r>
+              <a:rPr lang="ru-RU" sz="1200" b="0" i="0" kern="1200" dirty="0">
+                <a:solidFill>
+                  <a:schemeClr val="tx1"/>
+                </a:solidFill>
+                <a:effectLst/>
+                <a:latin typeface="+mn-lt"/>
+                <a:ea typeface="+mn-ea"/>
+                <a:cs typeface="+mn-cs"/>
+              </a:rPr>
+              <a:t> </a:t>
+            </a:r>
+            <a:r>
+              <a:rPr lang="ru-RU" sz="1200" b="0" i="0" kern="1200" dirty="0" err="1">
+                <a:solidFill>
+                  <a:schemeClr val="tx1"/>
+                </a:solidFill>
+                <a:effectLst/>
+                <a:latin typeface="+mn-lt"/>
+                <a:ea typeface="+mn-ea"/>
+                <a:cs typeface="+mn-cs"/>
+              </a:rPr>
+              <a:t>hell</a:t>
+            </a:r>
+            <a:r>
+              <a:rPr lang="ru-RU" sz="1200" b="0" i="0" kern="1200" dirty="0">
+                <a:solidFill>
+                  <a:schemeClr val="tx1"/>
+                </a:solidFill>
+                <a:effectLst/>
+                <a:latin typeface="+mn-lt"/>
+                <a:ea typeface="+mn-ea"/>
+                <a:cs typeface="+mn-cs"/>
+              </a:rPr>
+              <a:t>». К сожалению, в реализации </a:t>
+            </a:r>
+            <a:r>
+              <a:rPr lang="ru-RU" sz="1200" b="0" i="0" kern="1200" dirty="0" err="1">
+                <a:solidFill>
+                  <a:schemeClr val="tx1"/>
+                </a:solidFill>
+                <a:effectLst/>
+                <a:latin typeface="+mn-lt"/>
+                <a:ea typeface="+mn-ea"/>
+                <a:cs typeface="+mn-cs"/>
+              </a:rPr>
+              <a:t>ReactPHP</a:t>
+            </a:r>
+            <a:r>
+              <a:rPr lang="ru-RU" sz="1200" b="0" i="0" kern="1200" dirty="0">
+                <a:solidFill>
+                  <a:schemeClr val="tx1"/>
+                </a:solidFill>
+                <a:effectLst/>
+                <a:latin typeface="+mn-lt"/>
+                <a:ea typeface="+mn-ea"/>
+                <a:cs typeface="+mn-cs"/>
+              </a:rPr>
+              <a:t> это приводит к проблеме «</a:t>
+            </a:r>
+            <a:r>
+              <a:rPr lang="ru-RU" sz="1200" b="0" i="0" kern="1200" dirty="0" err="1">
+                <a:solidFill>
+                  <a:schemeClr val="tx1"/>
+                </a:solidFill>
+                <a:effectLst/>
+                <a:latin typeface="+mn-lt"/>
+                <a:ea typeface="+mn-ea"/>
+                <a:cs typeface="+mn-cs"/>
+              </a:rPr>
+              <a:t>Promise</a:t>
+            </a:r>
+            <a:r>
+              <a:rPr lang="ru-RU" sz="1200" b="0" i="0" kern="1200" dirty="0">
+                <a:solidFill>
+                  <a:schemeClr val="tx1"/>
+                </a:solidFill>
+                <a:effectLst/>
+                <a:latin typeface="+mn-lt"/>
+                <a:ea typeface="+mn-ea"/>
+                <a:cs typeface="+mn-cs"/>
+              </a:rPr>
+              <a:t> </a:t>
+            </a:r>
+            <a:r>
+              <a:rPr lang="ru-RU" sz="1200" b="0" i="0" kern="1200" dirty="0" err="1">
+                <a:solidFill>
+                  <a:schemeClr val="tx1"/>
+                </a:solidFill>
+                <a:effectLst/>
+                <a:latin typeface="+mn-lt"/>
+                <a:ea typeface="+mn-ea"/>
+                <a:cs typeface="+mn-cs"/>
+              </a:rPr>
+              <a:t>hell</a:t>
+            </a:r>
+            <a:r>
+              <a:rPr lang="ru-RU" sz="1200" b="0" i="0" kern="1200" dirty="0">
+                <a:solidFill>
+                  <a:schemeClr val="tx1"/>
+                </a:solidFill>
+                <a:effectLst/>
+                <a:latin typeface="+mn-lt"/>
+                <a:ea typeface="+mn-ea"/>
+                <a:cs typeface="+mn-cs"/>
+              </a:rPr>
+              <a:t>», когда </a:t>
+            </a:r>
+            <a:r>
+              <a:rPr lang="ru-RU" sz="1200" b="1" i="0" kern="1200" dirty="0">
+                <a:solidFill>
+                  <a:schemeClr val="tx1"/>
+                </a:solidFill>
+                <a:effectLst/>
+                <a:latin typeface="+mn-lt"/>
+                <a:ea typeface="+mn-ea"/>
+                <a:cs typeface="+mn-cs"/>
+              </a:rPr>
+              <a:t>для корректного подключения </a:t>
+            </a:r>
+            <a:r>
+              <a:rPr lang="ru-RU" sz="1200" b="1" i="0" kern="1200" dirty="0" err="1">
+                <a:solidFill>
+                  <a:schemeClr val="tx1"/>
+                </a:solidFill>
+                <a:effectLst/>
+                <a:latin typeface="+mn-lt"/>
+                <a:ea typeface="+mn-ea"/>
+                <a:cs typeface="+mn-cs"/>
+              </a:rPr>
+              <a:t>RabbitMQ</a:t>
+            </a:r>
+            <a:r>
+              <a:rPr lang="ru-RU" sz="1200" b="1" i="0" kern="1200" dirty="0">
+                <a:solidFill>
+                  <a:schemeClr val="tx1"/>
+                </a:solidFill>
+                <a:effectLst/>
+                <a:latin typeface="+mn-lt"/>
+                <a:ea typeface="+mn-ea"/>
+                <a:cs typeface="+mn-cs"/>
+              </a:rPr>
+              <a:t>, требуется10-11 </a:t>
+            </a:r>
+            <a:r>
+              <a:rPr lang="ru-RU" sz="1200" b="1" i="0" kern="1200" dirty="0" err="1">
+                <a:solidFill>
+                  <a:schemeClr val="tx1"/>
+                </a:solidFill>
+                <a:effectLst/>
+                <a:latin typeface="+mn-lt"/>
+                <a:ea typeface="+mn-ea"/>
+                <a:cs typeface="+mn-cs"/>
+              </a:rPr>
+              <a:t>колбэков</a:t>
+            </a:r>
+            <a:r>
+              <a:rPr lang="ru-RU" sz="1200" b="0" i="0" kern="1200" dirty="0">
+                <a:solidFill>
+                  <a:schemeClr val="tx1"/>
+                </a:solidFill>
+                <a:effectLst/>
+                <a:latin typeface="+mn-lt"/>
+                <a:ea typeface="+mn-ea"/>
+                <a:cs typeface="+mn-cs"/>
+              </a:rPr>
+              <a:t>. Работать с таким кодом и исправлять его сложно. Я быстро понял, что это не мое и перешел на AMPHP.</a:t>
+            </a:r>
             <a:endParaRPr lang="ru-RU" dirty="0"/>
           </a:p>
         </p:txBody>
@@ -2443,7 +3075,727 @@
           <a:p>
             <a:fld id="{D89B9A15-25E0-4EFC-AE60-5F4B1D2C49DD}" type="slidenum">
               <a:rPr lang="ru-RU" smtClean="0"/>
+              <a:t>14</a:t>
+            </a:fld>
+            <a:endParaRPr lang="ru-RU"/>
+          </a:p>
+        </p:txBody>
+      </p:sp>
+    </p:spTree>
+    <p:extLst>
+      <p:ext uri="{BB962C8B-B14F-4D97-AF65-F5344CB8AC3E}">
+        <p14:creationId xmlns:p14="http://schemas.microsoft.com/office/powerpoint/2010/main" val="680570946"/>
+      </p:ext>
+    </p:extLst>
+  </p:cSld>
+  <p:clrMapOvr>
+    <a:masterClrMapping/>
+  </p:clrMapOvr>
+</p:notes>
+</file>
+
+<file path=ppt/notesSlides/notesSlide15.xml><?xml version="1.0" encoding="utf-8"?>
+<p:notes xmlns:a="http://schemas.openxmlformats.org/drawingml/2006/main" xmlns:r="http://schemas.openxmlformats.org/officeDocument/2006/relationships" xmlns:p="http://schemas.openxmlformats.org/presentationml/2006/main">
+  <p:cSld>
+    <p:spTree>
+      <p:nvGrpSpPr>
+        <p:cNvPr id="1" name=""/>
+        <p:cNvGrpSpPr/>
+        <p:nvPr/>
+      </p:nvGrpSpPr>
+      <p:grpSpPr>
+        <a:xfrm>
+          <a:off x="0" y="0"/>
+          <a:ext cx="0" cy="0"/>
+          <a:chOff x="0" y="0"/>
+          <a:chExt cx="0" cy="0"/>
+        </a:xfrm>
+      </p:grpSpPr>
+      <p:sp>
+        <p:nvSpPr>
+          <p:cNvPr id="2" name="Образ слайда 1"/>
+          <p:cNvSpPr>
+            <a:spLocks noGrp="1" noRot="1" noChangeAspect="1"/>
+          </p:cNvSpPr>
+          <p:nvPr>
+            <p:ph type="sldImg"/>
+          </p:nvPr>
+        </p:nvSpPr>
+        <p:spPr/>
+      </p:sp>
+      <p:sp>
+        <p:nvSpPr>
+          <p:cNvPr id="3" name="Заметки 2"/>
+          <p:cNvSpPr>
+            <a:spLocks noGrp="1"/>
+          </p:cNvSpPr>
+          <p:nvPr>
+            <p:ph type="body" idx="1"/>
+          </p:nvPr>
+        </p:nvSpPr>
+        <p:spPr/>
+        <p:txBody>
+          <a:bodyPr/>
+          <a:lstStyle/>
+          <a:p>
+            <a:r>
+              <a:rPr lang="ru-RU" sz="1200" b="0" i="0" kern="1200" dirty="0">
+                <a:solidFill>
+                  <a:schemeClr val="tx1"/>
+                </a:solidFill>
+                <a:effectLst/>
+                <a:latin typeface="+mn-lt"/>
+                <a:ea typeface="+mn-ea"/>
+                <a:cs typeface="+mn-cs"/>
+              </a:rPr>
+              <a:t>Этот проект младше, чем </a:t>
+            </a:r>
+            <a:r>
+              <a:rPr lang="ru-RU" sz="1200" b="0" i="0" kern="1200" dirty="0" err="1">
+                <a:solidFill>
+                  <a:schemeClr val="tx1"/>
+                </a:solidFill>
+                <a:effectLst/>
+                <a:latin typeface="+mn-lt"/>
+                <a:ea typeface="+mn-ea"/>
+                <a:cs typeface="+mn-cs"/>
+              </a:rPr>
+              <a:t>ReactPHP</a:t>
+            </a:r>
+            <a:r>
+              <a:rPr lang="ru-RU" sz="1200" b="0" i="0" kern="1200" dirty="0">
+                <a:solidFill>
+                  <a:schemeClr val="tx1"/>
+                </a:solidFill>
+                <a:effectLst/>
+                <a:latin typeface="+mn-lt"/>
+                <a:ea typeface="+mn-ea"/>
+                <a:cs typeface="+mn-cs"/>
+              </a:rPr>
+              <a:t>, и продвигает иную концепцию — </a:t>
+            </a:r>
+            <a:r>
+              <a:rPr lang="ru-RU" sz="1200" b="1" i="0" kern="1200" dirty="0" err="1">
+                <a:solidFill>
+                  <a:schemeClr val="tx1"/>
+                </a:solidFill>
+                <a:effectLst/>
+                <a:latin typeface="+mn-lt"/>
+                <a:ea typeface="+mn-ea"/>
+                <a:cs typeface="+mn-cs"/>
+              </a:rPr>
+              <a:t>корутины</a:t>
+            </a:r>
+            <a:r>
+              <a:rPr lang="ru-RU" sz="1200" b="0" i="0" kern="1200" dirty="0">
+                <a:solidFill>
+                  <a:schemeClr val="tx1"/>
+                </a:solidFill>
+                <a:effectLst/>
+                <a:latin typeface="+mn-lt"/>
+                <a:ea typeface="+mn-ea"/>
+                <a:cs typeface="+mn-cs"/>
+              </a:rPr>
+              <a:t>. Если посмотреть на работу с </a:t>
+            </a:r>
+            <a:r>
+              <a:rPr lang="ru-RU" sz="1200" b="0" i="0" kern="1200" dirty="0" err="1">
+                <a:solidFill>
+                  <a:schemeClr val="tx1"/>
+                </a:solidFill>
+                <a:effectLst/>
+                <a:latin typeface="+mn-lt"/>
+                <a:ea typeface="+mn-ea"/>
+                <a:cs typeface="+mn-cs"/>
+              </a:rPr>
+              <a:t>MySQL</a:t>
+            </a:r>
+            <a:r>
+              <a:rPr lang="ru-RU" sz="1200" b="0" i="0" kern="1200" dirty="0">
+                <a:solidFill>
+                  <a:schemeClr val="tx1"/>
+                </a:solidFill>
+                <a:effectLst/>
+                <a:latin typeface="+mn-lt"/>
+                <a:ea typeface="+mn-ea"/>
+                <a:cs typeface="+mn-cs"/>
+              </a:rPr>
+              <a:t> в AMPHP, то видно, что это почти аналогично работе с </a:t>
+            </a:r>
+            <a:r>
+              <a:rPr lang="ru-RU" dirty="0" err="1"/>
+              <a:t>PDOConnection</a:t>
+            </a:r>
+            <a:r>
+              <a:rPr lang="ru-RU" sz="1200" b="0" i="0" kern="1200" dirty="0">
+                <a:solidFill>
+                  <a:schemeClr val="tx1"/>
+                </a:solidFill>
+                <a:effectLst/>
+                <a:latin typeface="+mn-lt"/>
+                <a:ea typeface="+mn-ea"/>
+                <a:cs typeface="+mn-cs"/>
+              </a:rPr>
+              <a:t> в PHP.</a:t>
+            </a:r>
+            <a:endParaRPr lang="en-US" sz="1200" b="0" i="0" kern="1200" dirty="0">
+              <a:solidFill>
+                <a:schemeClr val="tx1"/>
+              </a:solidFill>
+              <a:effectLst/>
+              <a:latin typeface="+mn-lt"/>
+              <a:ea typeface="+mn-ea"/>
+              <a:cs typeface="+mn-cs"/>
+            </a:endParaRPr>
+          </a:p>
+          <a:p>
+            <a:endParaRPr lang="en-US" sz="1200" b="0" i="0" kern="1200" dirty="0">
+              <a:solidFill>
+                <a:schemeClr val="tx1"/>
+              </a:solidFill>
+              <a:effectLst/>
+              <a:latin typeface="+mn-lt"/>
+              <a:ea typeface="+mn-ea"/>
+              <a:cs typeface="+mn-cs"/>
+            </a:endParaRPr>
+          </a:p>
+          <a:p>
+            <a:r>
+              <a:rPr lang="ru-RU" sz="1200" b="0" i="0" kern="1200" dirty="0">
+                <a:solidFill>
+                  <a:schemeClr val="tx1"/>
+                </a:solidFill>
+                <a:effectLst/>
+                <a:latin typeface="+mn-lt"/>
+                <a:ea typeface="+mn-ea"/>
+                <a:cs typeface="+mn-cs"/>
+              </a:rPr>
+              <a:t>Здесь мы создаем пул, подключаемся и выполняем запрос. Мы можем обрабатывать ошибки через привычные </a:t>
+            </a:r>
+            <a:r>
+              <a:rPr lang="ru-RU" dirty="0" err="1"/>
+              <a:t>try</a:t>
+            </a:r>
+            <a:r>
+              <a:rPr lang="ru-RU" dirty="0"/>
+              <a:t>...</a:t>
+            </a:r>
+            <a:r>
+              <a:rPr lang="ru-RU" dirty="0" err="1"/>
+              <a:t>catch</a:t>
+            </a:r>
+            <a:r>
+              <a:rPr lang="ru-RU" sz="1200" b="0" i="0" kern="1200" dirty="0">
+                <a:solidFill>
+                  <a:schemeClr val="tx1"/>
+                </a:solidFill>
+                <a:effectLst/>
+                <a:latin typeface="+mn-lt"/>
+                <a:ea typeface="+mn-ea"/>
+                <a:cs typeface="+mn-cs"/>
+              </a:rPr>
+              <a:t>, нам не нужны </a:t>
+            </a:r>
+            <a:r>
+              <a:rPr lang="ru-RU" sz="1200" b="0" i="0" kern="1200" dirty="0" err="1">
+                <a:solidFill>
+                  <a:schemeClr val="tx1"/>
+                </a:solidFill>
+                <a:effectLst/>
+                <a:latin typeface="+mn-lt"/>
+                <a:ea typeface="+mn-ea"/>
+                <a:cs typeface="+mn-cs"/>
+              </a:rPr>
+              <a:t>колбэки</a:t>
+            </a:r>
+            <a:r>
+              <a:rPr lang="ru-RU" sz="1200" b="0" i="0" kern="1200" dirty="0">
+                <a:solidFill>
+                  <a:schemeClr val="tx1"/>
+                </a:solidFill>
+                <a:effectLst/>
+                <a:latin typeface="+mn-lt"/>
+                <a:ea typeface="+mn-ea"/>
+                <a:cs typeface="+mn-cs"/>
+              </a:rPr>
+              <a:t>.</a:t>
+            </a:r>
+            <a:br>
+              <a:rPr lang="ru-RU" dirty="0"/>
+            </a:br>
+            <a:br>
+              <a:rPr lang="ru-RU" dirty="0"/>
+            </a:br>
+            <a:r>
+              <a:rPr lang="ru-RU" sz="1200" b="0" i="0" kern="1200" dirty="0">
+                <a:solidFill>
+                  <a:schemeClr val="tx1"/>
+                </a:solidFill>
+                <a:effectLst/>
+                <a:latin typeface="+mn-lt"/>
+                <a:ea typeface="+mn-ea"/>
+                <a:cs typeface="+mn-cs"/>
+              </a:rPr>
+              <a:t>Но перед асинхронным вызовом здесь появляется ключевое слово — </a:t>
+            </a:r>
+            <a:r>
+              <a:rPr lang="ru-RU" dirty="0" err="1"/>
+              <a:t>yield</a:t>
+            </a:r>
+            <a:r>
+              <a:rPr lang="ru-RU" sz="1200" b="0" i="0" kern="1200" dirty="0">
+                <a:solidFill>
+                  <a:schemeClr val="tx1"/>
+                </a:solidFill>
+                <a:effectLst/>
+                <a:latin typeface="+mn-lt"/>
+                <a:ea typeface="+mn-ea"/>
+                <a:cs typeface="+mn-cs"/>
+              </a:rPr>
+              <a:t>.</a:t>
+            </a:r>
+            <a:endParaRPr lang="en-US" sz="1200" b="0" i="0" kern="1200" dirty="0">
+              <a:solidFill>
+                <a:schemeClr val="tx1"/>
+              </a:solidFill>
+              <a:effectLst/>
+              <a:latin typeface="+mn-lt"/>
+              <a:ea typeface="+mn-ea"/>
+              <a:cs typeface="+mn-cs"/>
+            </a:endParaRPr>
+          </a:p>
+          <a:p>
+            <a:endParaRPr lang="en-US" sz="1200" b="0" i="0" kern="1200" dirty="0">
+              <a:solidFill>
+                <a:schemeClr val="tx1"/>
+              </a:solidFill>
+              <a:effectLst/>
+              <a:latin typeface="+mn-lt"/>
+              <a:ea typeface="+mn-ea"/>
+              <a:cs typeface="+mn-cs"/>
+            </a:endParaRPr>
+          </a:p>
+          <a:p>
+            <a:r>
+              <a:rPr lang="ru-RU" sz="1200" b="0" i="0" kern="1200" dirty="0">
+                <a:solidFill>
+                  <a:schemeClr val="tx1"/>
+                </a:solidFill>
+                <a:effectLst/>
+                <a:latin typeface="+mn-lt"/>
+                <a:ea typeface="+mn-ea"/>
+                <a:cs typeface="+mn-cs"/>
+              </a:rPr>
+              <a:t>Ключевое слово </a:t>
+            </a:r>
+            <a:r>
+              <a:rPr lang="ru-RU" dirty="0" err="1"/>
+              <a:t>yield</a:t>
+            </a:r>
+            <a:r>
+              <a:rPr lang="ru-RU" sz="1200" b="0" i="0" kern="1200" dirty="0">
+                <a:solidFill>
+                  <a:schemeClr val="tx1"/>
+                </a:solidFill>
+                <a:effectLst/>
+                <a:latin typeface="+mn-lt"/>
+                <a:ea typeface="+mn-ea"/>
+                <a:cs typeface="+mn-cs"/>
+              </a:rPr>
+              <a:t> превращает нашу функцию в генератор.</a:t>
+            </a:r>
+            <a:endParaRPr lang="en-US" sz="1200" b="0" i="0" kern="1200" dirty="0">
+              <a:solidFill>
+                <a:schemeClr val="tx1"/>
+              </a:solidFill>
+              <a:effectLst/>
+              <a:latin typeface="+mn-lt"/>
+              <a:ea typeface="+mn-ea"/>
+              <a:cs typeface="+mn-cs"/>
+            </a:endParaRPr>
+          </a:p>
+          <a:p>
+            <a:r>
+              <a:rPr lang="ru-RU" sz="1200" b="0" i="0" kern="1200" dirty="0">
+                <a:solidFill>
+                  <a:schemeClr val="tx1"/>
+                </a:solidFill>
+                <a:effectLst/>
+                <a:latin typeface="+mn-lt"/>
+                <a:ea typeface="+mn-ea"/>
+                <a:cs typeface="+mn-cs"/>
+              </a:rPr>
+              <a:t>Как только интерпретатор PHP встречает </a:t>
+            </a:r>
+            <a:r>
+              <a:rPr lang="ru-RU" dirty="0" err="1"/>
+              <a:t>yield</a:t>
+            </a:r>
+            <a:r>
+              <a:rPr lang="ru-RU" sz="1200" b="0" i="0" kern="1200" dirty="0">
+                <a:solidFill>
+                  <a:schemeClr val="tx1"/>
+                </a:solidFill>
+                <a:effectLst/>
+                <a:latin typeface="+mn-lt"/>
+                <a:ea typeface="+mn-ea"/>
+                <a:cs typeface="+mn-cs"/>
+              </a:rPr>
+              <a:t> в теле функции, он понимает, что это функция-генератор. Вместо выполнения при вызове создается объект класса </a:t>
+            </a:r>
+            <a:r>
+              <a:rPr lang="ru-RU" dirty="0" err="1"/>
+              <a:t>Generator</a:t>
+            </a:r>
+            <a:r>
+              <a:rPr lang="ru-RU" sz="1200" b="0" i="0" kern="1200" dirty="0">
+                <a:solidFill>
+                  <a:schemeClr val="tx1"/>
+                </a:solidFill>
+                <a:effectLst/>
+                <a:latin typeface="+mn-lt"/>
+                <a:ea typeface="+mn-ea"/>
+                <a:cs typeface="+mn-cs"/>
+              </a:rPr>
+              <a:t>.</a:t>
+            </a:r>
+            <a:endParaRPr lang="en-US" sz="1200" b="0" i="0" kern="1200" dirty="0">
+              <a:solidFill>
+                <a:schemeClr val="tx1"/>
+              </a:solidFill>
+              <a:effectLst/>
+              <a:latin typeface="+mn-lt"/>
+              <a:ea typeface="+mn-ea"/>
+              <a:cs typeface="+mn-cs"/>
+            </a:endParaRPr>
+          </a:p>
+          <a:p>
+            <a:r>
+              <a:rPr lang="ru-RU" sz="1200" b="0" i="0" kern="1200" dirty="0">
+                <a:solidFill>
+                  <a:schemeClr val="tx1"/>
+                </a:solidFill>
+                <a:effectLst/>
+                <a:latin typeface="+mn-lt"/>
+                <a:ea typeface="+mn-ea"/>
+                <a:cs typeface="+mn-cs"/>
+              </a:rPr>
+              <a:t>У генератора есть интересная функция — мы можем снаружи отправить данные в генератор. В этом случае это уже не совсем генератор, а </a:t>
+            </a:r>
+            <a:r>
+              <a:rPr lang="ru-RU" sz="1200" b="1" i="0" kern="1200" dirty="0" err="1">
+                <a:solidFill>
+                  <a:schemeClr val="tx1"/>
+                </a:solidFill>
+                <a:effectLst/>
+                <a:latin typeface="+mn-lt"/>
+                <a:ea typeface="+mn-ea"/>
+                <a:cs typeface="+mn-cs"/>
+              </a:rPr>
+              <a:t>корутина</a:t>
+            </a:r>
+            <a:r>
+              <a:rPr lang="ru-RU" sz="1200" b="0" i="0" kern="1200" dirty="0">
+                <a:solidFill>
+                  <a:schemeClr val="tx1"/>
+                </a:solidFill>
+                <a:effectLst/>
+                <a:latin typeface="+mn-lt"/>
+                <a:ea typeface="+mn-ea"/>
+                <a:cs typeface="+mn-cs"/>
+              </a:rPr>
+              <a:t> или сопрограмма.</a:t>
+            </a:r>
+          </a:p>
+          <a:p>
+            <a:endParaRPr lang="ru-RU" sz="1200" b="0" i="0" kern="1200" dirty="0">
+              <a:solidFill>
+                <a:schemeClr val="tx1"/>
+              </a:solidFill>
+              <a:effectLst/>
+              <a:latin typeface="+mn-lt"/>
+              <a:ea typeface="+mn-ea"/>
+              <a:cs typeface="+mn-cs"/>
+            </a:endParaRPr>
+          </a:p>
+          <a:p>
+            <a:r>
+              <a:rPr lang="ru-RU" sz="1200" b="0" i="0" kern="1200" dirty="0">
+                <a:solidFill>
+                  <a:schemeClr val="tx1"/>
+                </a:solidFill>
+                <a:effectLst/>
+                <a:latin typeface="+mn-lt"/>
+                <a:ea typeface="+mn-ea"/>
+                <a:cs typeface="+mn-cs"/>
+              </a:rPr>
+              <a:t>Кроме отправки данных в генератор можно отправлять ошибки и обрабатывать их изнутри, что удобно.</a:t>
+            </a:r>
+          </a:p>
+          <a:p>
+            <a:r>
+              <a:rPr lang="ru-RU" sz="1200" b="0" i="0" kern="1200" dirty="0">
+                <a:solidFill>
+                  <a:schemeClr val="tx1"/>
+                </a:solidFill>
+                <a:effectLst/>
+                <a:latin typeface="+mn-lt"/>
+                <a:ea typeface="+mn-ea"/>
+                <a:cs typeface="+mn-cs"/>
+              </a:rPr>
+              <a:t>Подытожим. </a:t>
+            </a:r>
+            <a:r>
+              <a:rPr lang="ru-RU" sz="1200" b="0" i="0" kern="1200" dirty="0" err="1">
+                <a:solidFill>
+                  <a:schemeClr val="tx1"/>
+                </a:solidFill>
+                <a:effectLst/>
+                <a:latin typeface="+mn-lt"/>
+                <a:ea typeface="+mn-ea"/>
+                <a:cs typeface="+mn-cs"/>
+              </a:rPr>
+              <a:t>Корутина</a:t>
+            </a:r>
+            <a:r>
+              <a:rPr lang="ru-RU" sz="1200" b="0" i="0" kern="1200" dirty="0">
+                <a:solidFill>
+                  <a:schemeClr val="tx1"/>
+                </a:solidFill>
+                <a:effectLst/>
+                <a:latin typeface="+mn-lt"/>
+                <a:ea typeface="+mn-ea"/>
+                <a:cs typeface="+mn-cs"/>
+              </a:rPr>
+              <a:t> это компонент программы, который</a:t>
+            </a:r>
+            <a:r>
+              <a:rPr lang="ru-RU" sz="1200" b="1" i="0" kern="1200" dirty="0">
+                <a:solidFill>
+                  <a:schemeClr val="tx1"/>
+                </a:solidFill>
+                <a:effectLst/>
+                <a:latin typeface="+mn-lt"/>
+                <a:ea typeface="+mn-ea"/>
+                <a:cs typeface="+mn-cs"/>
+              </a:rPr>
+              <a:t> поддерживает остановку и продолжение выполнения с сохранением текущего состояния</a:t>
+            </a:r>
+            <a:r>
+              <a:rPr lang="ru-RU" sz="1200" b="0" i="0" kern="1200" dirty="0">
+                <a:solidFill>
+                  <a:schemeClr val="tx1"/>
+                </a:solidFill>
+                <a:effectLst/>
+                <a:latin typeface="+mn-lt"/>
+                <a:ea typeface="+mn-ea"/>
+                <a:cs typeface="+mn-cs"/>
+              </a:rPr>
+              <a:t>. </a:t>
+            </a:r>
+            <a:r>
+              <a:rPr lang="ru-RU" sz="1200" b="0" i="0" kern="1200" dirty="0" err="1">
+                <a:solidFill>
+                  <a:schemeClr val="tx1"/>
+                </a:solidFill>
+                <a:effectLst/>
+                <a:latin typeface="+mn-lt"/>
+                <a:ea typeface="+mn-ea"/>
+                <a:cs typeface="+mn-cs"/>
+              </a:rPr>
+              <a:t>Корутина</a:t>
+            </a:r>
+            <a:r>
+              <a:rPr lang="ru-RU" sz="1200" b="0" i="0" kern="1200" dirty="0">
+                <a:solidFill>
+                  <a:schemeClr val="tx1"/>
+                </a:solidFill>
+                <a:effectLst/>
+                <a:latin typeface="+mn-lt"/>
+                <a:ea typeface="+mn-ea"/>
+                <a:cs typeface="+mn-cs"/>
+              </a:rPr>
+              <a:t> помнит свой стек вызовов, данные внутри, и может их использовать в дальнейшем.</a:t>
+            </a:r>
+          </a:p>
+          <a:p>
+            <a:endParaRPr lang="ru-RU" sz="1200" b="0" i="0" kern="1200" dirty="0">
+              <a:solidFill>
+                <a:schemeClr val="tx1"/>
+              </a:solidFill>
+              <a:effectLst/>
+              <a:latin typeface="+mn-lt"/>
+              <a:ea typeface="+mn-ea"/>
+              <a:cs typeface="+mn-cs"/>
+            </a:endParaRPr>
+          </a:p>
+          <a:p>
+            <a:r>
+              <a:rPr lang="ru-RU" sz="1200" b="0" i="0" kern="1200" dirty="0">
+                <a:solidFill>
+                  <a:schemeClr val="tx1"/>
+                </a:solidFill>
+                <a:effectLst/>
+                <a:latin typeface="+mn-lt"/>
+                <a:ea typeface="+mn-ea"/>
+                <a:cs typeface="+mn-cs"/>
+              </a:rPr>
+              <a:t>Посмотрим на интерфейсы генераторов и </a:t>
+            </a:r>
+            <a:r>
+              <a:rPr lang="ru-RU" sz="1200" b="0" i="0" kern="1200" dirty="0" err="1">
+                <a:solidFill>
+                  <a:schemeClr val="tx1"/>
+                </a:solidFill>
+                <a:effectLst/>
+                <a:latin typeface="+mn-lt"/>
+                <a:ea typeface="+mn-ea"/>
+                <a:cs typeface="+mn-cs"/>
+              </a:rPr>
+              <a:t>Promise</a:t>
+            </a:r>
+            <a:r>
+              <a:rPr lang="ru-RU" sz="1200" b="0" i="0" kern="1200" dirty="0">
+                <a:solidFill>
+                  <a:schemeClr val="tx1"/>
+                </a:solidFill>
+                <a:effectLst/>
+                <a:latin typeface="+mn-lt"/>
+                <a:ea typeface="+mn-ea"/>
+                <a:cs typeface="+mn-cs"/>
+              </a:rPr>
+              <a:t>. Они выглядят одинаково, за исключением разных названий методов. Мы можем отправить данные и выкинуть ошибку и в генератор, и в </a:t>
+            </a:r>
+            <a:r>
+              <a:rPr lang="ru-RU" sz="1200" b="0" i="0" kern="1200" dirty="0" err="1">
+                <a:solidFill>
+                  <a:schemeClr val="tx1"/>
+                </a:solidFill>
+                <a:effectLst/>
+                <a:latin typeface="+mn-lt"/>
+                <a:ea typeface="+mn-ea"/>
+                <a:cs typeface="+mn-cs"/>
+              </a:rPr>
+              <a:t>Promise</a:t>
+            </a:r>
+            <a:r>
+              <a:rPr lang="ru-RU" sz="1200" b="0" i="0" kern="1200" dirty="0">
+                <a:solidFill>
+                  <a:schemeClr val="tx1"/>
+                </a:solidFill>
+                <a:effectLst/>
+                <a:latin typeface="+mn-lt"/>
+                <a:ea typeface="+mn-ea"/>
+                <a:cs typeface="+mn-cs"/>
+              </a:rPr>
+              <a:t>.</a:t>
+            </a:r>
+            <a:endParaRPr lang="ru-RU" dirty="0"/>
+          </a:p>
+        </p:txBody>
+      </p:sp>
+      <p:sp>
+        <p:nvSpPr>
+          <p:cNvPr id="4" name="Номер слайда 3"/>
+          <p:cNvSpPr>
+            <a:spLocks noGrp="1"/>
+          </p:cNvSpPr>
+          <p:nvPr>
+            <p:ph type="sldNum" sz="quarter" idx="5"/>
+          </p:nvPr>
+        </p:nvSpPr>
+        <p:spPr/>
+        <p:txBody>
+          <a:bodyPr/>
+          <a:lstStyle/>
+          <a:p>
+            <a:fld id="{D89B9A15-25E0-4EFC-AE60-5F4B1D2C49DD}" type="slidenum">
+              <a:rPr lang="ru-RU" smtClean="0"/>
               <a:t>15</a:t>
+            </a:fld>
+            <a:endParaRPr lang="ru-RU"/>
+          </a:p>
+        </p:txBody>
+      </p:sp>
+    </p:spTree>
+    <p:extLst>
+      <p:ext uri="{BB962C8B-B14F-4D97-AF65-F5344CB8AC3E}">
+        <p14:creationId xmlns:p14="http://schemas.microsoft.com/office/powerpoint/2010/main" val="2902931137"/>
+      </p:ext>
+    </p:extLst>
+  </p:cSld>
+  <p:clrMapOvr>
+    <a:masterClrMapping/>
+  </p:clrMapOvr>
+</p:notes>
+</file>
+
+<file path=ppt/notesSlides/notesSlide16.xml><?xml version="1.0" encoding="utf-8"?>
+<p:notes xmlns:a="http://schemas.openxmlformats.org/drawingml/2006/main" xmlns:r="http://schemas.openxmlformats.org/officeDocument/2006/relationships" xmlns:p="http://schemas.openxmlformats.org/presentationml/2006/main">
+  <p:cSld>
+    <p:spTree>
+      <p:nvGrpSpPr>
+        <p:cNvPr id="1" name=""/>
+        <p:cNvGrpSpPr/>
+        <p:nvPr/>
+      </p:nvGrpSpPr>
+      <p:grpSpPr>
+        <a:xfrm>
+          <a:off x="0" y="0"/>
+          <a:ext cx="0" cy="0"/>
+          <a:chOff x="0" y="0"/>
+          <a:chExt cx="0" cy="0"/>
+        </a:xfrm>
+      </p:grpSpPr>
+      <p:sp>
+        <p:nvSpPr>
+          <p:cNvPr id="2" name="Образ слайда 1"/>
+          <p:cNvSpPr>
+            <a:spLocks noGrp="1" noRot="1" noChangeAspect="1"/>
+          </p:cNvSpPr>
+          <p:nvPr>
+            <p:ph type="sldImg"/>
+          </p:nvPr>
+        </p:nvSpPr>
+        <p:spPr/>
+      </p:sp>
+      <p:sp>
+        <p:nvSpPr>
+          <p:cNvPr id="3" name="Заметки 2"/>
+          <p:cNvSpPr>
+            <a:spLocks noGrp="1"/>
+          </p:cNvSpPr>
+          <p:nvPr>
+            <p:ph type="body" idx="1"/>
+          </p:nvPr>
+        </p:nvSpPr>
+        <p:spPr/>
+        <p:txBody>
+          <a:bodyPr/>
+          <a:lstStyle/>
+          <a:p>
+            <a:endParaRPr lang="ru-RU" dirty="0"/>
+          </a:p>
+        </p:txBody>
+      </p:sp>
+      <p:sp>
+        <p:nvSpPr>
+          <p:cNvPr id="4" name="Номер слайда 3"/>
+          <p:cNvSpPr>
+            <a:spLocks noGrp="1"/>
+          </p:cNvSpPr>
+          <p:nvPr>
+            <p:ph type="sldNum" sz="quarter" idx="5"/>
+          </p:nvPr>
+        </p:nvSpPr>
+        <p:spPr/>
+        <p:txBody>
+          <a:bodyPr/>
+          <a:lstStyle/>
+          <a:p>
+            <a:fld id="{D89B9A15-25E0-4EFC-AE60-5F4B1D2C49DD}" type="slidenum">
+              <a:rPr lang="ru-RU" smtClean="0"/>
+              <a:t>17</a:t>
             </a:fld>
             <a:endParaRPr lang="ru-RU"/>
           </a:p>
@@ -4490,7 +5842,7 @@
           <a:p>
             <a:fld id="{CE2EB3E4-AA37-4C06-8331-1684B1E316E6}" type="datetimeFigureOut">
               <a:rPr lang="ru-RU" smtClean="0"/>
-              <a:t>12.01.2022</a:t>
+              <a:t>14.01.2022</a:t>
             </a:fld>
             <a:endParaRPr lang="ru-RU"/>
           </a:p>
@@ -4688,7 +6040,7 @@
           <a:p>
             <a:fld id="{CE2EB3E4-AA37-4C06-8331-1684B1E316E6}" type="datetimeFigureOut">
               <a:rPr lang="ru-RU" smtClean="0"/>
-              <a:t>12.01.2022</a:t>
+              <a:t>14.01.2022</a:t>
             </a:fld>
             <a:endParaRPr lang="ru-RU"/>
           </a:p>
@@ -4896,7 +6248,7 @@
           <a:p>
             <a:fld id="{CE2EB3E4-AA37-4C06-8331-1684B1E316E6}" type="datetimeFigureOut">
               <a:rPr lang="ru-RU" smtClean="0"/>
-              <a:t>12.01.2022</a:t>
+              <a:t>14.01.2022</a:t>
             </a:fld>
             <a:endParaRPr lang="ru-RU"/>
           </a:p>
@@ -5094,7 +6446,7 @@
           <a:p>
             <a:fld id="{CE2EB3E4-AA37-4C06-8331-1684B1E316E6}" type="datetimeFigureOut">
               <a:rPr lang="ru-RU" smtClean="0"/>
-              <a:t>12.01.2022</a:t>
+              <a:t>14.01.2022</a:t>
             </a:fld>
             <a:endParaRPr lang="ru-RU"/>
           </a:p>
@@ -5369,7 +6721,7 @@
           <a:p>
             <a:fld id="{CE2EB3E4-AA37-4C06-8331-1684B1E316E6}" type="datetimeFigureOut">
               <a:rPr lang="ru-RU" smtClean="0"/>
-              <a:t>12.01.2022</a:t>
+              <a:t>14.01.2022</a:t>
             </a:fld>
             <a:endParaRPr lang="ru-RU"/>
           </a:p>
@@ -5634,7 +6986,7 @@
           <a:p>
             <a:fld id="{CE2EB3E4-AA37-4C06-8331-1684B1E316E6}" type="datetimeFigureOut">
               <a:rPr lang="ru-RU" smtClean="0"/>
-              <a:t>12.01.2022</a:t>
+              <a:t>14.01.2022</a:t>
             </a:fld>
             <a:endParaRPr lang="ru-RU"/>
           </a:p>
@@ -6046,7 +7398,7 @@
           <a:p>
             <a:fld id="{CE2EB3E4-AA37-4C06-8331-1684B1E316E6}" type="datetimeFigureOut">
               <a:rPr lang="ru-RU" smtClean="0"/>
-              <a:t>12.01.2022</a:t>
+              <a:t>14.01.2022</a:t>
             </a:fld>
             <a:endParaRPr lang="ru-RU"/>
           </a:p>
@@ -6187,7 +7539,7 @@
           <a:p>
             <a:fld id="{CE2EB3E4-AA37-4C06-8331-1684B1E316E6}" type="datetimeFigureOut">
               <a:rPr lang="ru-RU" smtClean="0"/>
-              <a:t>12.01.2022</a:t>
+              <a:t>14.01.2022</a:t>
             </a:fld>
             <a:endParaRPr lang="ru-RU"/>
           </a:p>
@@ -6300,7 +7652,7 @@
           <a:p>
             <a:fld id="{CE2EB3E4-AA37-4C06-8331-1684B1E316E6}" type="datetimeFigureOut">
               <a:rPr lang="ru-RU" smtClean="0"/>
-              <a:t>12.01.2022</a:t>
+              <a:t>14.01.2022</a:t>
             </a:fld>
             <a:endParaRPr lang="ru-RU"/>
           </a:p>
@@ -6611,7 +7963,7 @@
           <a:p>
             <a:fld id="{CE2EB3E4-AA37-4C06-8331-1684B1E316E6}" type="datetimeFigureOut">
               <a:rPr lang="ru-RU" smtClean="0"/>
-              <a:t>12.01.2022</a:t>
+              <a:t>14.01.2022</a:t>
             </a:fld>
             <a:endParaRPr lang="ru-RU"/>
           </a:p>
@@ -6899,7 +8251,7 @@
           <a:p>
             <a:fld id="{CE2EB3E4-AA37-4C06-8331-1684B1E316E6}" type="datetimeFigureOut">
               <a:rPr lang="ru-RU" smtClean="0"/>
-              <a:t>12.01.2022</a:t>
+              <a:t>14.01.2022</a:t>
             </a:fld>
             <a:endParaRPr lang="ru-RU"/>
           </a:p>
@@ -7140,7 +8492,7 @@
           <a:p>
             <a:fld id="{CE2EB3E4-AA37-4C06-8331-1684B1E316E6}" type="datetimeFigureOut">
               <a:rPr lang="ru-RU" smtClean="0"/>
-              <a:t>12.01.2022</a:t>
+              <a:t>14.01.2022</a:t>
             </a:fld>
             <a:endParaRPr lang="ru-RU"/>
           </a:p>
@@ -8288,8 +9640,8 @@
         </p:blipFill>
         <p:spPr>
           <a:xfrm>
-            <a:off x="1960506" y="1002393"/>
-            <a:ext cx="916596" cy="1363436"/>
+            <a:off x="1982808" y="768217"/>
+            <a:ext cx="804147" cy="1196168"/>
           </a:xfrm>
           <a:prstGeom prst="rect">
             <a:avLst/>
@@ -8323,8 +9675,8 @@
         </p:blipFill>
         <p:spPr>
           <a:xfrm>
-            <a:off x="1715169" y="2947325"/>
-            <a:ext cx="1480265" cy="1449597"/>
+            <a:off x="1726318" y="2188791"/>
+            <a:ext cx="1309458" cy="1282329"/>
           </a:xfrm>
           <a:prstGeom prst="rect">
             <a:avLst/>
@@ -8359,8 +9711,8 @@
         </p:blipFill>
         <p:spPr>
           <a:xfrm>
-            <a:off x="1437108" y="4978418"/>
-            <a:ext cx="1963392" cy="1178035"/>
+            <a:off x="1481712" y="3807411"/>
+            <a:ext cx="1795327" cy="1077196"/>
           </a:xfrm>
           <a:prstGeom prst="rect">
             <a:avLst/>
@@ -8381,8 +9733,8 @@
         </p:nvSpPr>
         <p:spPr>
           <a:xfrm>
-            <a:off x="4820354" y="1391723"/>
-            <a:ext cx="3560398" cy="584775"/>
+            <a:off x="4809202" y="990279"/>
+            <a:ext cx="4171142" cy="584775"/>
           </a:xfrm>
           <a:prstGeom prst="rect">
             <a:avLst/>
@@ -8401,7 +9753,180 @@
                 </a:solidFill>
                 <a:latin typeface="-apple-system"/>
               </a:rPr>
-              <a:t>PHP 5.3+, Promise A</a:t>
+              <a:t>PHP</a:t>
+            </a:r>
+            <a:r>
+              <a:rPr lang="ru-RU" sz="3200" dirty="0">
+                <a:solidFill>
+                  <a:srgbClr val="111111"/>
+                </a:solidFill>
+                <a:latin typeface="-apple-system"/>
+              </a:rPr>
+              <a:t> </a:t>
+            </a:r>
+            <a:r>
+              <a:rPr lang="en-US" sz="3200" dirty="0">
+                <a:solidFill>
+                  <a:srgbClr val="111111"/>
+                </a:solidFill>
+                <a:latin typeface="-apple-system"/>
+              </a:rPr>
+              <a:t>&gt;= 5.3</a:t>
+            </a:r>
+            <a:r>
+              <a:rPr lang="ru-RU" sz="3200" dirty="0">
+                <a:solidFill>
+                  <a:srgbClr val="111111"/>
+                </a:solidFill>
+                <a:latin typeface="-apple-system"/>
+              </a:rPr>
+              <a:t>.8</a:t>
+            </a:r>
+            <a:r>
+              <a:rPr lang="en-US" sz="3200" dirty="0">
+                <a:solidFill>
+                  <a:srgbClr val="111111"/>
+                </a:solidFill>
+                <a:latin typeface="-apple-system"/>
+              </a:rPr>
+              <a:t>, Promise A</a:t>
+            </a:r>
+            <a:endParaRPr lang="ru-RU" sz="3200" dirty="0"/>
+          </a:p>
+        </p:txBody>
+      </p:sp>
+      <p:sp>
+        <p:nvSpPr>
+          <p:cNvPr id="7" name="Прямоугольник 6">
+            <a:extLst>
+              <a:ext uri="{FF2B5EF4-FFF2-40B4-BE49-F238E27FC236}">
+                <a16:creationId xmlns:a16="http://schemas.microsoft.com/office/drawing/2014/main" id="{BEABAFFE-869C-4E29-A39F-DB64CC884653}"/>
+              </a:ext>
+            </a:extLst>
+          </p:cNvPr>
+          <p:cNvSpPr/>
+          <p:nvPr/>
+        </p:nvSpPr>
+        <p:spPr>
+          <a:xfrm>
+            <a:off x="4809200" y="2621201"/>
+            <a:ext cx="3994812" cy="584775"/>
+          </a:xfrm>
+          <a:prstGeom prst="rect">
+            <a:avLst/>
+          </a:prstGeom>
+        </p:spPr>
+        <p:txBody>
+          <a:bodyPr wrap="none">
+            <a:spAutoFit/>
+          </a:bodyPr>
+          <a:lstStyle/>
+          <a:p>
+            <a:r>
+              <a:rPr lang="en-US" sz="3200" dirty="0">
+                <a:solidFill>
+                  <a:srgbClr val="111111"/>
+                </a:solidFill>
+                <a:latin typeface="-apple-system"/>
+              </a:rPr>
+              <a:t>PHP &gt;= </a:t>
+            </a:r>
+            <a:r>
+              <a:rPr lang="ru-RU" sz="3200" dirty="0">
+                <a:solidFill>
+                  <a:srgbClr val="111111"/>
+                </a:solidFill>
+                <a:latin typeface="-apple-system"/>
+              </a:rPr>
+              <a:t>7.1</a:t>
+            </a:r>
+            <a:r>
+              <a:rPr lang="en-US" sz="3200" dirty="0">
+                <a:solidFill>
+                  <a:srgbClr val="111111"/>
+                </a:solidFill>
+                <a:latin typeface="-apple-system"/>
+              </a:rPr>
+              <a:t>, Coroutines</a:t>
+            </a:r>
+            <a:endParaRPr lang="ru-RU" sz="3200" dirty="0"/>
+          </a:p>
+        </p:txBody>
+      </p:sp>
+      <p:pic>
+        <p:nvPicPr>
+          <p:cNvPr id="5" name="Рисунок 4">
+            <a:extLst>
+              <a:ext uri="{FF2B5EF4-FFF2-40B4-BE49-F238E27FC236}">
+                <a16:creationId xmlns:a16="http://schemas.microsoft.com/office/drawing/2014/main" id="{E0DC8272-E55C-4ACE-BEA6-1AEB098D8EB0}"/>
+              </a:ext>
+            </a:extLst>
+          </p:cNvPr>
+          <p:cNvPicPr>
+            <a:picLocks noChangeAspect="1"/>
+          </p:cNvPicPr>
+          <p:nvPr/>
+        </p:nvPicPr>
+        <p:blipFill>
+          <a:blip r:embed="rId7">
+            <a:extLst>
+              <a:ext uri="{28A0092B-C50C-407E-A947-70E740481C1C}">
+                <a14:useLocalDpi xmlns:a14="http://schemas.microsoft.com/office/drawing/2010/main" val="0"/>
+              </a:ext>
+              <a:ext uri="{96DAC541-7B7A-43D3-8B79-37D633B846F1}">
+                <asvg:svgBlip xmlns:asvg="http://schemas.microsoft.com/office/drawing/2016/SVG/main" r:embed="rId8"/>
+              </a:ext>
+            </a:extLst>
+          </a:blip>
+          <a:stretch>
+            <a:fillRect/>
+          </a:stretch>
+        </p:blipFill>
+        <p:spPr>
+          <a:xfrm>
+            <a:off x="1481712" y="5499410"/>
+            <a:ext cx="1958336" cy="477643"/>
+          </a:xfrm>
+          <a:prstGeom prst="rect">
+            <a:avLst/>
+          </a:prstGeom>
+        </p:spPr>
+      </p:pic>
+      <p:sp>
+        <p:nvSpPr>
+          <p:cNvPr id="9" name="Прямоугольник 8">
+            <a:extLst>
+              <a:ext uri="{FF2B5EF4-FFF2-40B4-BE49-F238E27FC236}">
+                <a16:creationId xmlns:a16="http://schemas.microsoft.com/office/drawing/2014/main" id="{A7286E80-9793-416A-AE69-3CB642709727}"/>
+              </a:ext>
+            </a:extLst>
+          </p:cNvPr>
+          <p:cNvSpPr/>
+          <p:nvPr/>
+        </p:nvSpPr>
+        <p:spPr>
+          <a:xfrm>
+            <a:off x="4809200" y="5445843"/>
+            <a:ext cx="3396507" cy="584775"/>
+          </a:xfrm>
+          <a:prstGeom prst="rect">
+            <a:avLst/>
+          </a:prstGeom>
+        </p:spPr>
+        <p:txBody>
+          <a:bodyPr wrap="none">
+            <a:spAutoFit/>
+          </a:bodyPr>
+          <a:lstStyle/>
+          <a:p>
+            <a:r>
+              <a:rPr lang="en-US" sz="3200" dirty="0">
+                <a:solidFill>
+                  <a:srgbClr val="111111"/>
+                </a:solidFill>
+                <a:latin typeface="-apple-system"/>
+              </a:rPr>
+              <a:t>PHP &gt;=8.0.7, Fibers</a:t>
             </a:r>
             <a:endParaRPr lang="ru-RU" sz="3200" dirty="0"/>
           </a:p>
@@ -8421,6 +9946,184 @@
 </file>
 
 <file path=ppt/slides/slide13.xml><?xml version="1.0" encoding="utf-8"?>
+<p:sld xmlns:a="http://schemas.openxmlformats.org/drawingml/2006/main" xmlns:r="http://schemas.openxmlformats.org/officeDocument/2006/relationships" xmlns:p="http://schemas.openxmlformats.org/presentationml/2006/main">
+  <p:cSld>
+    <p:spTree>
+      <p:nvGrpSpPr>
+        <p:cNvPr id="1" name=""/>
+        <p:cNvGrpSpPr/>
+        <p:nvPr/>
+      </p:nvGrpSpPr>
+      <p:grpSpPr>
+        <a:xfrm>
+          <a:off x="0" y="0"/>
+          <a:ext cx="0" cy="0"/>
+          <a:chOff x="0" y="0"/>
+          <a:chExt cx="0" cy="0"/>
+        </a:xfrm>
+      </p:grpSpPr>
+      <p:sp>
+        <p:nvSpPr>
+          <p:cNvPr id="2" name="Заголовок 1">
+            <a:extLst>
+              <a:ext uri="{FF2B5EF4-FFF2-40B4-BE49-F238E27FC236}">
+                <a16:creationId xmlns:a16="http://schemas.microsoft.com/office/drawing/2014/main" id="{67572889-B4DC-41CE-9BB0-5ECF098B7517}"/>
+              </a:ext>
+            </a:extLst>
+          </p:cNvPr>
+          <p:cNvSpPr>
+            <a:spLocks noGrp="1"/>
+          </p:cNvSpPr>
+          <p:nvPr>
+            <p:ph type="title"/>
+          </p:nvPr>
+        </p:nvSpPr>
+        <p:spPr/>
+        <p:txBody>
+          <a:bodyPr>
+            <a:normAutofit/>
+          </a:bodyPr>
+          <a:lstStyle/>
+          <a:p>
+            <a:r>
+              <a:rPr lang="ru-RU" sz="4000" dirty="0"/>
+              <a:t>Фреймворки и компоненты использующие асинхронность:</a:t>
+            </a:r>
+          </a:p>
+        </p:txBody>
+      </p:sp>
+      <p:sp>
+        <p:nvSpPr>
+          <p:cNvPr id="3" name="Объект 2">
+            <a:extLst>
+              <a:ext uri="{FF2B5EF4-FFF2-40B4-BE49-F238E27FC236}">
+                <a16:creationId xmlns:a16="http://schemas.microsoft.com/office/drawing/2014/main" id="{105F99E4-2BF6-48AC-B346-63572292B4E5}"/>
+              </a:ext>
+            </a:extLst>
+          </p:cNvPr>
+          <p:cNvSpPr>
+            <a:spLocks noGrp="1"/>
+          </p:cNvSpPr>
+          <p:nvPr>
+            <p:ph idx="1"/>
+          </p:nvPr>
+        </p:nvSpPr>
+        <p:spPr/>
+        <p:txBody>
+          <a:bodyPr>
+            <a:normAutofit/>
+          </a:bodyPr>
+          <a:lstStyle/>
+          <a:p>
+            <a:pPr>
+              <a:lnSpc>
+                <a:spcPct val="100000"/>
+              </a:lnSpc>
+              <a:spcBef>
+                <a:spcPts val="1800"/>
+              </a:spcBef>
+            </a:pPr>
+            <a:r>
+              <a:rPr lang="en-US" dirty="0"/>
+              <a:t>Rachet</a:t>
+            </a:r>
+            <a:endParaRPr lang="ru-RU" dirty="0"/>
+          </a:p>
+          <a:p>
+            <a:pPr>
+              <a:lnSpc>
+                <a:spcPct val="100000"/>
+              </a:lnSpc>
+              <a:spcBef>
+                <a:spcPts val="1800"/>
+              </a:spcBef>
+            </a:pPr>
+            <a:r>
+              <a:rPr lang="en-US" dirty="0"/>
+              <a:t>Laravel Octane</a:t>
+            </a:r>
+            <a:endParaRPr lang="ru-RU" dirty="0"/>
+          </a:p>
+          <a:p>
+            <a:pPr>
+              <a:lnSpc>
+                <a:spcPct val="100000"/>
+              </a:lnSpc>
+              <a:spcBef>
+                <a:spcPts val="1800"/>
+              </a:spcBef>
+            </a:pPr>
+            <a:r>
+              <a:rPr lang="en-US" dirty="0" err="1"/>
+              <a:t>DriftPHP</a:t>
+            </a:r>
+            <a:endParaRPr lang="ru-RU" dirty="0"/>
+          </a:p>
+          <a:p>
+            <a:pPr>
+              <a:lnSpc>
+                <a:spcPct val="100000"/>
+              </a:lnSpc>
+              <a:spcBef>
+                <a:spcPts val="1800"/>
+              </a:spcBef>
+            </a:pPr>
+            <a:r>
+              <a:rPr lang="en-US" dirty="0"/>
+              <a:t>Framework X</a:t>
+            </a:r>
+            <a:endParaRPr lang="ru-RU" dirty="0"/>
+          </a:p>
+          <a:p>
+            <a:pPr>
+              <a:lnSpc>
+                <a:spcPct val="100000"/>
+              </a:lnSpc>
+              <a:spcBef>
+                <a:spcPts val="1800"/>
+              </a:spcBef>
+            </a:pPr>
+            <a:r>
+              <a:rPr lang="en-US" dirty="0"/>
+              <a:t>Antidot Framework</a:t>
+            </a:r>
+            <a:endParaRPr lang="ru-RU" dirty="0"/>
+          </a:p>
+          <a:p>
+            <a:pPr>
+              <a:lnSpc>
+                <a:spcPct val="100000"/>
+              </a:lnSpc>
+              <a:spcBef>
+                <a:spcPts val="1800"/>
+              </a:spcBef>
+            </a:pPr>
+            <a:r>
+              <a:rPr lang="en-US" dirty="0" err="1"/>
+              <a:t>Symfony</a:t>
+            </a:r>
+            <a:r>
+              <a:rPr lang="en-US" dirty="0"/>
+              <a:t> Runtime</a:t>
+            </a:r>
+            <a:endParaRPr lang="ru-RU" dirty="0"/>
+          </a:p>
+        </p:txBody>
+      </p:sp>
+    </p:spTree>
+    <p:extLst>
+      <p:ext uri="{BB962C8B-B14F-4D97-AF65-F5344CB8AC3E}">
+        <p14:creationId xmlns:p14="http://schemas.microsoft.com/office/powerpoint/2010/main" val="279280687"/>
+      </p:ext>
+    </p:extLst>
+  </p:cSld>
+  <p:clrMapOvr>
+    <a:masterClrMapping/>
+  </p:clrMapOvr>
+</p:sld>
+</file>
+
+<file path=ppt/slides/slide14.xml><?xml version="1.0" encoding="utf-8"?>
 <p:sld xmlns:a="http://schemas.openxmlformats.org/drawingml/2006/main" xmlns:r="http://schemas.openxmlformats.org/officeDocument/2006/relationships" xmlns:p="http://schemas.openxmlformats.org/presentationml/2006/main">
   <p:cSld>
     <p:spTree>
@@ -9213,7 +10916,7 @@
 </p:sld>
 </file>
 
-<file path=ppt/slides/slide14.xml><?xml version="1.0" encoding="utf-8"?>
+<file path=ppt/slides/slide15.xml><?xml version="1.0" encoding="utf-8"?>
 <p:sld xmlns:a="http://schemas.openxmlformats.org/drawingml/2006/main" xmlns:r="http://schemas.openxmlformats.org/officeDocument/2006/relationships" xmlns:p="http://schemas.openxmlformats.org/presentationml/2006/main">
   <p:cSld>
     <p:spTree>
@@ -9251,6 +10954,11 @@
           <a:bodyPr/>
           <a:lstStyle/>
           <a:p>
+            <a:pPr algn="ctr"/>
+            <a:r>
+              <a:rPr lang="en-US" dirty="0"/>
+              <a:t>AMPHP</a:t>
+            </a:r>
             <a:endParaRPr lang="ru-RU" dirty="0"/>
           </a:p>
         </p:txBody>
@@ -9273,10 +10981,549 @@
         </p:nvSpPr>
         <p:spPr/>
         <p:txBody>
-          <a:bodyPr/>
+          <a:bodyPr>
+            <a:normAutofit/>
+          </a:bodyPr>
           <a:lstStyle/>
           <a:p>
-            <a:endParaRPr lang="ru-RU" dirty="0"/>
+            <a:pPr marL="0" indent="0">
+              <a:buNone/>
+            </a:pPr>
+            <a:r>
+              <a:rPr lang="en-US" sz="2400" dirty="0">
+                <a:solidFill>
+                  <a:srgbClr val="24292F"/>
+                </a:solidFill>
+                <a:latin typeface="Consolas" panose="020B0609020204030204" pitchFamily="49" charset="0"/>
+              </a:rPr>
+              <a:t>$pool </a:t>
+            </a:r>
+            <a:r>
+              <a:rPr lang="en-US" sz="2400" dirty="0">
+                <a:solidFill>
+                  <a:srgbClr val="CF222E"/>
+                </a:solidFill>
+                <a:latin typeface="Consolas" panose="020B0609020204030204" pitchFamily="49" charset="0"/>
+              </a:rPr>
+              <a:t>=</a:t>
+            </a:r>
+            <a:r>
+              <a:rPr lang="en-US" sz="2400" dirty="0">
+                <a:solidFill>
+                  <a:srgbClr val="24292F"/>
+                </a:solidFill>
+                <a:latin typeface="Consolas" panose="020B0609020204030204" pitchFamily="49" charset="0"/>
+              </a:rPr>
+              <a:t> </a:t>
+            </a:r>
+            <a:r>
+              <a:rPr lang="en-US" sz="2400" dirty="0" err="1">
+                <a:solidFill>
+                  <a:srgbClr val="0550AE"/>
+                </a:solidFill>
+                <a:latin typeface="Consolas" panose="020B0609020204030204" pitchFamily="49" charset="0"/>
+              </a:rPr>
+              <a:t>Mysql</a:t>
+            </a:r>
+            <a:r>
+              <a:rPr lang="en-US" sz="2400" dirty="0">
+                <a:solidFill>
+                  <a:srgbClr val="0550AE"/>
+                </a:solidFill>
+                <a:latin typeface="Consolas" panose="020B0609020204030204" pitchFamily="49" charset="0"/>
+              </a:rPr>
+              <a:t>\</a:t>
+            </a:r>
+            <a:r>
+              <a:rPr lang="en-US" sz="2400" dirty="0">
+                <a:solidFill>
+                  <a:srgbClr val="8250DF"/>
+                </a:solidFill>
+                <a:latin typeface="Consolas" panose="020B0609020204030204" pitchFamily="49" charset="0"/>
+              </a:rPr>
+              <a:t>pool</a:t>
+            </a:r>
+            <a:r>
+              <a:rPr lang="en-US" sz="2400" dirty="0">
+                <a:solidFill>
+                  <a:srgbClr val="24292F"/>
+                </a:solidFill>
+                <a:latin typeface="Consolas" panose="020B0609020204030204" pitchFamily="49" charset="0"/>
+              </a:rPr>
+              <a:t>(</a:t>
+            </a:r>
+            <a:r>
+              <a:rPr lang="en-US" sz="2400" dirty="0">
+                <a:solidFill>
+                  <a:srgbClr val="0A3069"/>
+                </a:solidFill>
+                <a:latin typeface="Consolas" panose="020B0609020204030204" pitchFamily="49" charset="0"/>
+              </a:rPr>
+              <a:t>"host=127.0.0.1 port=3306 </a:t>
+            </a:r>
+            <a:r>
+              <a:rPr lang="en-US" sz="2400" dirty="0" err="1">
+                <a:solidFill>
+                  <a:srgbClr val="0A3069"/>
+                </a:solidFill>
+                <a:latin typeface="Consolas" panose="020B0609020204030204" pitchFamily="49" charset="0"/>
+              </a:rPr>
+              <a:t>db</a:t>
+            </a:r>
+            <a:r>
+              <a:rPr lang="en-US" sz="2400" dirty="0">
+                <a:solidFill>
+                  <a:srgbClr val="0A3069"/>
+                </a:solidFill>
+                <a:latin typeface="Consolas" panose="020B0609020204030204" pitchFamily="49" charset="0"/>
+              </a:rPr>
+              <a:t>=test"</a:t>
+            </a:r>
+            <a:r>
+              <a:rPr lang="en-US" sz="2400" dirty="0">
+                <a:solidFill>
+                  <a:srgbClr val="24292F"/>
+                </a:solidFill>
+                <a:latin typeface="Consolas" panose="020B0609020204030204" pitchFamily="49" charset="0"/>
+              </a:rPr>
+              <a:t>);</a:t>
+            </a:r>
+          </a:p>
+          <a:p>
+            <a:pPr marL="0" indent="0">
+              <a:buNone/>
+            </a:pPr>
+            <a:br>
+              <a:rPr lang="en-US" sz="2400" dirty="0">
+                <a:solidFill>
+                  <a:srgbClr val="24292F"/>
+                </a:solidFill>
+                <a:latin typeface="Consolas" panose="020B0609020204030204" pitchFamily="49" charset="0"/>
+              </a:rPr>
+            </a:br>
+            <a:r>
+              <a:rPr lang="en-US" sz="2400" dirty="0">
+                <a:solidFill>
+                  <a:srgbClr val="CF222E"/>
+                </a:solidFill>
+                <a:latin typeface="Consolas" panose="020B0609020204030204" pitchFamily="49" charset="0"/>
+              </a:rPr>
+              <a:t>try</a:t>
+            </a:r>
+            <a:r>
+              <a:rPr lang="en-US" sz="2400" dirty="0">
+                <a:solidFill>
+                  <a:srgbClr val="24292F"/>
+                </a:solidFill>
+                <a:latin typeface="Consolas" panose="020B0609020204030204" pitchFamily="49" charset="0"/>
+              </a:rPr>
+              <a:t> {</a:t>
+            </a:r>
+          </a:p>
+          <a:p>
+            <a:pPr marL="0" indent="0">
+              <a:buNone/>
+            </a:pPr>
+            <a:r>
+              <a:rPr lang="en-US" sz="2400" dirty="0">
+                <a:solidFill>
+                  <a:srgbClr val="24292F"/>
+                </a:solidFill>
+                <a:latin typeface="Consolas" panose="020B0609020204030204" pitchFamily="49" charset="0"/>
+              </a:rPr>
+              <a:t>    $result </a:t>
+            </a:r>
+            <a:r>
+              <a:rPr lang="en-US" sz="2400" dirty="0">
+                <a:solidFill>
+                  <a:srgbClr val="CF222E"/>
+                </a:solidFill>
+                <a:latin typeface="Consolas" panose="020B0609020204030204" pitchFamily="49" charset="0"/>
+              </a:rPr>
+              <a:t>=</a:t>
+            </a:r>
+            <a:r>
+              <a:rPr lang="en-US" sz="2400" dirty="0">
+                <a:solidFill>
+                  <a:srgbClr val="24292F"/>
+                </a:solidFill>
+                <a:latin typeface="Consolas" panose="020B0609020204030204" pitchFamily="49" charset="0"/>
+              </a:rPr>
+              <a:t> </a:t>
+            </a:r>
+            <a:r>
+              <a:rPr lang="en-US" sz="2400" dirty="0">
+                <a:solidFill>
+                  <a:srgbClr val="CF222E"/>
+                </a:solidFill>
+                <a:latin typeface="Consolas" panose="020B0609020204030204" pitchFamily="49" charset="0"/>
+              </a:rPr>
+              <a:t>yield</a:t>
+            </a:r>
+            <a:r>
+              <a:rPr lang="en-US" sz="2400" dirty="0">
+                <a:solidFill>
+                  <a:srgbClr val="24292F"/>
+                </a:solidFill>
+                <a:latin typeface="Consolas" panose="020B0609020204030204" pitchFamily="49" charset="0"/>
+              </a:rPr>
+              <a:t> $pool</a:t>
+            </a:r>
+            <a:r>
+              <a:rPr lang="en-US" sz="2400" dirty="0">
+                <a:solidFill>
+                  <a:srgbClr val="CF222E"/>
+                </a:solidFill>
+                <a:latin typeface="Consolas" panose="020B0609020204030204" pitchFamily="49" charset="0"/>
+              </a:rPr>
+              <a:t>-&gt;</a:t>
+            </a:r>
+            <a:r>
+              <a:rPr lang="en-US" sz="2400" dirty="0">
+                <a:solidFill>
+                  <a:srgbClr val="8250DF"/>
+                </a:solidFill>
+                <a:latin typeface="Consolas" panose="020B0609020204030204" pitchFamily="49" charset="0"/>
+              </a:rPr>
+              <a:t>query</a:t>
+            </a:r>
+            <a:r>
+              <a:rPr lang="en-US" sz="2400" dirty="0">
+                <a:solidFill>
+                  <a:srgbClr val="24292F"/>
+                </a:solidFill>
+                <a:latin typeface="Consolas" panose="020B0609020204030204" pitchFamily="49" charset="0"/>
+              </a:rPr>
+              <a:t>(</a:t>
+            </a:r>
+            <a:r>
+              <a:rPr lang="en-US" sz="2400" dirty="0">
+                <a:solidFill>
+                  <a:srgbClr val="0A3069"/>
+                </a:solidFill>
+                <a:latin typeface="Consolas" panose="020B0609020204030204" pitchFamily="49" charset="0"/>
+              </a:rPr>
+              <a:t>"</a:t>
+            </a:r>
+            <a:r>
+              <a:rPr lang="en-US" sz="2400" dirty="0">
+                <a:solidFill>
+                  <a:srgbClr val="CF222E"/>
+                </a:solidFill>
+                <a:latin typeface="Consolas" panose="020B0609020204030204" pitchFamily="49" charset="0"/>
+              </a:rPr>
+              <a:t>UPDATE</a:t>
+            </a:r>
+            <a:r>
+              <a:rPr lang="en-US" sz="2400" dirty="0">
+                <a:solidFill>
+                  <a:srgbClr val="24292F"/>
+                </a:solidFill>
+                <a:latin typeface="Consolas" panose="020B0609020204030204" pitchFamily="49" charset="0"/>
+              </a:rPr>
+              <a:t> users </a:t>
+            </a:r>
+            <a:r>
+              <a:rPr lang="en-US" sz="2400" dirty="0">
+                <a:solidFill>
+                  <a:srgbClr val="CF222E"/>
+                </a:solidFill>
+                <a:latin typeface="Consolas" panose="020B0609020204030204" pitchFamily="49" charset="0"/>
+              </a:rPr>
+              <a:t>SET</a:t>
+            </a:r>
+            <a:r>
+              <a:rPr lang="en-US" sz="2400" dirty="0">
+                <a:solidFill>
+                  <a:srgbClr val="24292F"/>
+                </a:solidFill>
+                <a:latin typeface="Consolas" panose="020B0609020204030204" pitchFamily="49" charset="0"/>
+              </a:rPr>
+              <a:t> ...</a:t>
+            </a:r>
+            <a:r>
+              <a:rPr lang="en-US" sz="2400" dirty="0">
+                <a:solidFill>
+                  <a:srgbClr val="0A3069"/>
+                </a:solidFill>
+                <a:latin typeface="Consolas" panose="020B0609020204030204" pitchFamily="49" charset="0"/>
+              </a:rPr>
+              <a:t>"</a:t>
+            </a:r>
+            <a:r>
+              <a:rPr lang="en-US" sz="2400" dirty="0">
+                <a:solidFill>
+                  <a:srgbClr val="24292F"/>
+                </a:solidFill>
+                <a:latin typeface="Consolas" panose="020B0609020204030204" pitchFamily="49" charset="0"/>
+              </a:rPr>
+              <a:t>);</a:t>
+            </a:r>
+          </a:p>
+          <a:p>
+            <a:pPr marL="0" indent="0">
+              <a:buNone/>
+            </a:pPr>
+            <a:br>
+              <a:rPr lang="en-US" sz="2400" dirty="0">
+                <a:solidFill>
+                  <a:srgbClr val="24292F"/>
+                </a:solidFill>
+                <a:latin typeface="Consolas" panose="020B0609020204030204" pitchFamily="49" charset="0"/>
+              </a:rPr>
+            </a:br>
+            <a:r>
+              <a:rPr lang="en-US" sz="2400" dirty="0">
+                <a:solidFill>
+                  <a:srgbClr val="24292F"/>
+                </a:solidFill>
+                <a:latin typeface="Consolas" panose="020B0609020204030204" pitchFamily="49" charset="0"/>
+              </a:rPr>
+              <a:t>    </a:t>
+            </a:r>
+            <a:r>
+              <a:rPr lang="en-US" sz="2400" dirty="0">
+                <a:solidFill>
+                  <a:srgbClr val="0550AE"/>
+                </a:solidFill>
+                <a:latin typeface="Consolas" panose="020B0609020204030204" pitchFamily="49" charset="0"/>
+              </a:rPr>
+              <a:t>echo</a:t>
+            </a:r>
+            <a:r>
+              <a:rPr lang="en-US" sz="2400" dirty="0">
+                <a:solidFill>
+                  <a:srgbClr val="24292F"/>
+                </a:solidFill>
+                <a:latin typeface="Consolas" panose="020B0609020204030204" pitchFamily="49" charset="0"/>
+              </a:rPr>
+              <a:t> $result</a:t>
+            </a:r>
+            <a:r>
+              <a:rPr lang="en-US" sz="2400" dirty="0">
+                <a:solidFill>
+                  <a:srgbClr val="CF222E"/>
+                </a:solidFill>
+                <a:latin typeface="Consolas" panose="020B0609020204030204" pitchFamily="49" charset="0"/>
+              </a:rPr>
+              <a:t>-&gt;</a:t>
+            </a:r>
+            <a:r>
+              <a:rPr lang="en-US" sz="2400" dirty="0" err="1">
+                <a:solidFill>
+                  <a:srgbClr val="24292F"/>
+                </a:solidFill>
+                <a:latin typeface="Consolas" panose="020B0609020204030204" pitchFamily="49" charset="0"/>
+              </a:rPr>
+              <a:t>affectedRows</a:t>
+            </a:r>
+            <a:r>
+              <a:rPr lang="en-US" sz="2400" dirty="0">
+                <a:solidFill>
+                  <a:srgbClr val="24292F"/>
+                </a:solidFill>
+                <a:latin typeface="Consolas" panose="020B0609020204030204" pitchFamily="49" charset="0"/>
+              </a:rPr>
+              <a:t> </a:t>
+            </a:r>
+            <a:r>
+              <a:rPr lang="en-US" sz="2400" dirty="0">
+                <a:solidFill>
+                  <a:srgbClr val="CF222E"/>
+                </a:solidFill>
+                <a:latin typeface="Consolas" panose="020B0609020204030204" pitchFamily="49" charset="0"/>
+              </a:rPr>
+              <a:t>.</a:t>
+            </a:r>
+            <a:r>
+              <a:rPr lang="en-US" sz="2400" dirty="0">
+                <a:solidFill>
+                  <a:srgbClr val="24292F"/>
+                </a:solidFill>
+                <a:latin typeface="Consolas" panose="020B0609020204030204" pitchFamily="49" charset="0"/>
+              </a:rPr>
+              <a:t> </a:t>
+            </a:r>
+            <a:r>
+              <a:rPr lang="en-US" sz="2400" dirty="0">
+                <a:solidFill>
+                  <a:srgbClr val="0A3069"/>
+                </a:solidFill>
+                <a:latin typeface="Consolas" panose="020B0609020204030204" pitchFamily="49" charset="0"/>
+              </a:rPr>
+              <a:t>' row(s) in set.'</a:t>
+            </a:r>
+            <a:r>
+              <a:rPr lang="en-US" sz="2400" dirty="0">
+                <a:solidFill>
+                  <a:srgbClr val="24292F"/>
+                </a:solidFill>
+                <a:latin typeface="Consolas" panose="020B0609020204030204" pitchFamily="49" charset="0"/>
+              </a:rPr>
+              <a:t>;</a:t>
+            </a:r>
+          </a:p>
+          <a:p>
+            <a:pPr marL="0" indent="0">
+              <a:buNone/>
+            </a:pPr>
+            <a:r>
+              <a:rPr lang="en-US" sz="2400" dirty="0">
+                <a:solidFill>
+                  <a:srgbClr val="24292F"/>
+                </a:solidFill>
+                <a:latin typeface="Consolas" panose="020B0609020204030204" pitchFamily="49" charset="0"/>
+              </a:rPr>
+              <a:t>} </a:t>
+            </a:r>
+            <a:r>
+              <a:rPr lang="en-US" sz="2400" dirty="0">
+                <a:solidFill>
+                  <a:srgbClr val="CF222E"/>
+                </a:solidFill>
+                <a:latin typeface="Consolas" panose="020B0609020204030204" pitchFamily="49" charset="0"/>
+              </a:rPr>
+              <a:t>catch</a:t>
+            </a:r>
+            <a:r>
+              <a:rPr lang="en-US" sz="2400" dirty="0">
+                <a:solidFill>
+                  <a:srgbClr val="24292F"/>
+                </a:solidFill>
+                <a:latin typeface="Consolas" panose="020B0609020204030204" pitchFamily="49" charset="0"/>
+              </a:rPr>
+              <a:t> (</a:t>
+            </a:r>
+            <a:r>
+              <a:rPr lang="en-US" sz="2400" dirty="0">
+                <a:solidFill>
+                  <a:srgbClr val="0550AE"/>
+                </a:solidFill>
+                <a:latin typeface="Consolas" panose="020B0609020204030204" pitchFamily="49" charset="0"/>
+              </a:rPr>
+              <a:t>\Throwable</a:t>
+            </a:r>
+            <a:r>
+              <a:rPr lang="en-US" sz="2400" dirty="0">
+                <a:solidFill>
+                  <a:srgbClr val="24292F"/>
+                </a:solidFill>
+                <a:latin typeface="Consolas" panose="020B0609020204030204" pitchFamily="49" charset="0"/>
+              </a:rPr>
+              <a:t> $error) {</a:t>
+            </a:r>
+          </a:p>
+          <a:p>
+            <a:pPr marL="0" indent="0">
+              <a:buNone/>
+            </a:pPr>
+            <a:r>
+              <a:rPr lang="en-US" sz="2400" dirty="0">
+                <a:solidFill>
+                  <a:srgbClr val="24292F"/>
+                </a:solidFill>
+                <a:latin typeface="Consolas" panose="020B0609020204030204" pitchFamily="49" charset="0"/>
+              </a:rPr>
+              <a:t>    </a:t>
+            </a:r>
+            <a:r>
+              <a:rPr lang="en-US" sz="2400" dirty="0">
+                <a:solidFill>
+                  <a:srgbClr val="0550AE"/>
+                </a:solidFill>
+                <a:latin typeface="Consolas" panose="020B0609020204030204" pitchFamily="49" charset="0"/>
+              </a:rPr>
+              <a:t>echo</a:t>
+            </a:r>
+            <a:r>
+              <a:rPr lang="en-US" sz="2400" dirty="0">
+                <a:solidFill>
+                  <a:srgbClr val="24292F"/>
+                </a:solidFill>
+                <a:latin typeface="Consolas" panose="020B0609020204030204" pitchFamily="49" charset="0"/>
+              </a:rPr>
+              <a:t> </a:t>
+            </a:r>
+            <a:r>
+              <a:rPr lang="en-US" sz="2400" dirty="0">
+                <a:solidFill>
+                  <a:srgbClr val="0A3069"/>
+                </a:solidFill>
+                <a:latin typeface="Consolas" panose="020B0609020204030204" pitchFamily="49" charset="0"/>
+              </a:rPr>
+              <a:t>'Error: '</a:t>
+            </a:r>
+            <a:r>
+              <a:rPr lang="en-US" sz="2400" dirty="0">
+                <a:solidFill>
+                  <a:srgbClr val="24292F"/>
+                </a:solidFill>
+                <a:latin typeface="Consolas" panose="020B0609020204030204" pitchFamily="49" charset="0"/>
+              </a:rPr>
+              <a:t> </a:t>
+            </a:r>
+            <a:r>
+              <a:rPr lang="en-US" sz="2400" dirty="0">
+                <a:solidFill>
+                  <a:srgbClr val="CF222E"/>
+                </a:solidFill>
+                <a:latin typeface="Consolas" panose="020B0609020204030204" pitchFamily="49" charset="0"/>
+              </a:rPr>
+              <a:t>.</a:t>
+            </a:r>
+            <a:r>
+              <a:rPr lang="en-US" sz="2400" dirty="0">
+                <a:solidFill>
+                  <a:srgbClr val="24292F"/>
+                </a:solidFill>
+                <a:latin typeface="Consolas" panose="020B0609020204030204" pitchFamily="49" charset="0"/>
+              </a:rPr>
+              <a:t> $error</a:t>
+            </a:r>
+            <a:r>
+              <a:rPr lang="en-US" sz="2400" dirty="0">
+                <a:solidFill>
+                  <a:srgbClr val="CF222E"/>
+                </a:solidFill>
+                <a:latin typeface="Consolas" panose="020B0609020204030204" pitchFamily="49" charset="0"/>
+              </a:rPr>
+              <a:t>-&gt;</a:t>
+            </a:r>
+            <a:r>
+              <a:rPr lang="en-US" sz="2400" dirty="0" err="1">
+                <a:solidFill>
+                  <a:srgbClr val="8250DF"/>
+                </a:solidFill>
+                <a:latin typeface="Consolas" panose="020B0609020204030204" pitchFamily="49" charset="0"/>
+              </a:rPr>
+              <a:t>getMessage</a:t>
+            </a:r>
+            <a:r>
+              <a:rPr lang="en-US" sz="2400" dirty="0">
+                <a:solidFill>
+                  <a:srgbClr val="24292F"/>
+                </a:solidFill>
+                <a:latin typeface="Consolas" panose="020B0609020204030204" pitchFamily="49" charset="0"/>
+              </a:rPr>
+              <a:t>();</a:t>
+            </a:r>
+          </a:p>
+          <a:p>
+            <a:pPr marL="0" indent="0">
+              <a:buNone/>
+            </a:pPr>
+            <a:r>
+              <a:rPr lang="en-US" sz="2400" dirty="0">
+                <a:solidFill>
+                  <a:srgbClr val="24292F"/>
+                </a:solidFill>
+                <a:latin typeface="Consolas" panose="020B0609020204030204" pitchFamily="49" charset="0"/>
+              </a:rPr>
+              <a:t>}</a:t>
+            </a:r>
+          </a:p>
+          <a:p>
+            <a:endParaRPr lang="ru-RU" sz="2400" dirty="0"/>
           </a:p>
         </p:txBody>
       </p:sp>
@@ -9293,7 +11540,87 @@
 </p:sld>
 </file>
 
-<file path=ppt/slides/slide15.xml><?xml version="1.0" encoding="utf-8"?>
+<file path=ppt/slides/slide16.xml><?xml version="1.0" encoding="utf-8"?>
+<p:sld xmlns:a="http://schemas.openxmlformats.org/drawingml/2006/main" xmlns:r="http://schemas.openxmlformats.org/officeDocument/2006/relationships" xmlns:p="http://schemas.openxmlformats.org/presentationml/2006/main">
+  <p:cSld>
+    <p:spTree>
+      <p:nvGrpSpPr>
+        <p:cNvPr id="1" name=""/>
+        <p:cNvGrpSpPr/>
+        <p:nvPr/>
+      </p:nvGrpSpPr>
+      <p:grpSpPr>
+        <a:xfrm>
+          <a:off x="0" y="0"/>
+          <a:ext cx="0" cy="0"/>
+          <a:chOff x="0" y="0"/>
+          <a:chExt cx="0" cy="0"/>
+        </a:xfrm>
+      </p:grpSpPr>
+      <p:sp>
+        <p:nvSpPr>
+          <p:cNvPr id="2" name="Заголовок 1">
+            <a:extLst>
+              <a:ext uri="{FF2B5EF4-FFF2-40B4-BE49-F238E27FC236}">
+                <a16:creationId xmlns:a16="http://schemas.microsoft.com/office/drawing/2014/main" id="{80CA8836-5158-40C7-9795-30624043EF2E}"/>
+              </a:ext>
+            </a:extLst>
+          </p:cNvPr>
+          <p:cNvSpPr>
+            <a:spLocks noGrp="1"/>
+          </p:cNvSpPr>
+          <p:nvPr>
+            <p:ph type="title"/>
+          </p:nvPr>
+        </p:nvSpPr>
+        <p:spPr/>
+        <p:txBody>
+          <a:bodyPr/>
+          <a:lstStyle/>
+          <a:p>
+            <a:endParaRPr lang="ru-RU"/>
+          </a:p>
+        </p:txBody>
+      </p:sp>
+      <p:sp>
+        <p:nvSpPr>
+          <p:cNvPr id="3" name="Объект 2">
+            <a:extLst>
+              <a:ext uri="{FF2B5EF4-FFF2-40B4-BE49-F238E27FC236}">
+                <a16:creationId xmlns:a16="http://schemas.microsoft.com/office/drawing/2014/main" id="{587C33F9-BB8F-4B37-99CB-57C52069D287}"/>
+              </a:ext>
+            </a:extLst>
+          </p:cNvPr>
+          <p:cNvSpPr>
+            <a:spLocks noGrp="1"/>
+          </p:cNvSpPr>
+          <p:nvPr>
+            <p:ph idx="1"/>
+          </p:nvPr>
+        </p:nvSpPr>
+        <p:spPr/>
+        <p:txBody>
+          <a:bodyPr/>
+          <a:lstStyle/>
+          <a:p>
+            <a:endParaRPr lang="ru-RU"/>
+          </a:p>
+        </p:txBody>
+      </p:sp>
+    </p:spTree>
+    <p:extLst>
+      <p:ext uri="{BB962C8B-B14F-4D97-AF65-F5344CB8AC3E}">
+        <p14:creationId xmlns:p14="http://schemas.microsoft.com/office/powerpoint/2010/main" val="1575785977"/>
+      </p:ext>
+    </p:extLst>
+  </p:cSld>
+  <p:clrMapOvr>
+    <a:masterClrMapping/>
+  </p:clrMapOvr>
+</p:sld>
+</file>
+
+<file path=ppt/slides/slide17.xml><?xml version="1.0" encoding="utf-8"?>
 <p:sld xmlns:a="http://schemas.openxmlformats.org/drawingml/2006/main" xmlns:r="http://schemas.openxmlformats.org/officeDocument/2006/relationships" xmlns:p="http://schemas.openxmlformats.org/presentationml/2006/main">
   <p:cSld>
     <p:spTree>

</xml_diff>